<commit_message>
Level 2 reset bug fixed.
</commit_message>
<xml_diff>
--- a/group19.pptx
+++ b/group19.pptx
@@ -108,6 +108,11 @@
       </a:defRPr>
     </a:lvl9pPr>
   </p:defaultTextStyle>
+  <p:extLst>
+    <p:ext uri="{EFAFB233-063F-42B5-8137-9DF3F51BA10A}">
+      <p15:sldGuideLst xmlns:p15="http://schemas.microsoft.com/office/powerpoint/2012/main"/>
+    </p:ext>
+  </p:extLst>
 </p:presentation>
 </file>
 
@@ -4111,8 +4116,37 @@
         </p:blipFill>
         <p:spPr>
           <a:xfrm>
-            <a:off x="1371600" y="3521243"/>
+            <a:off x="2703095" y="3521243"/>
             <a:ext cx="2454442" cy="2438400"/>
+          </a:xfrm>
+          <a:prstGeom prst="rect">
+            <a:avLst/>
+          </a:prstGeom>
+        </p:spPr>
+      </p:pic>
+      <p:pic>
+        <p:nvPicPr>
+          <p:cNvPr id="3" name="圖片 2">
+            <a:extLst>
+              <a:ext uri="{FF2B5EF4-FFF2-40B4-BE49-F238E27FC236}">
+                <a16:creationId xmlns:a16="http://schemas.microsoft.com/office/drawing/2014/main" id="{72DE9059-AEFA-43F3-9EBD-9EA37A84D918}"/>
+              </a:ext>
+            </a:extLst>
+          </p:cNvPr>
+          <p:cNvPicPr>
+            <a:picLocks noChangeAspect="1"/>
+          </p:cNvPicPr>
+          <p:nvPr/>
+        </p:nvPicPr>
+        <p:blipFill rotWithShape="1">
+          <a:blip r:embed="rId3"/>
+          <a:srcRect t="10489" r="9913" b="2151"/>
+          <a:stretch/>
+        </p:blipFill>
+        <p:spPr>
+          <a:xfrm>
+            <a:off x="7395412" y="3521242"/>
+            <a:ext cx="2454442" cy="2438401"/>
           </a:xfrm>
           <a:prstGeom prst="rect">
             <a:avLst/>
@@ -4174,7 +4208,7 @@
               <a:rPr lang="zh-TW" altLang="en-US" dirty="0">
                 <a:latin typeface="微軟正黑體" panose="020B0604030504040204" pitchFamily="34" charset="-120"/>
               </a:rPr>
-              <a:t>遊戲理念規則</a:t>
+              <a:t>遊戲玩法與規則</a:t>
             </a:r>
             <a:endParaRPr lang="zh-TW" altLang="en-US" dirty="0"/>
           </a:p>
@@ -4201,7 +4235,32 @@
           <a:bodyPr/>
           <a:lstStyle/>
           <a:p>
-            <a:endParaRPr lang="zh-TW" altLang="en-US"/>
+            <a:r>
+              <a:rPr lang="zh-TW" altLang="en-US" dirty="0"/>
+              <a:t>上下左右移動角色</a:t>
+            </a:r>
+            <a:endParaRPr lang="en-US" altLang="zh-TW" dirty="0"/>
+          </a:p>
+          <a:p>
+            <a:r>
+              <a:rPr lang="zh-TW" altLang="en-US" dirty="0"/>
+              <a:t>若木桶旁有空間則可以被推動</a:t>
+            </a:r>
+            <a:endParaRPr lang="en-US" altLang="zh-TW" dirty="0"/>
+          </a:p>
+          <a:p>
+            <a:r>
+              <a:rPr lang="zh-TW" altLang="en-US" dirty="0"/>
+              <a:t>到達樓梯則進入下一層</a:t>
+            </a:r>
+            <a:endParaRPr lang="en-US" altLang="zh-TW" dirty="0"/>
+          </a:p>
+          <a:p>
+            <a:r>
+              <a:rPr lang="zh-TW" altLang="en-US"/>
+              <a:t>遇到敵人要消耗一次移動次數</a:t>
+            </a:r>
+            <a:endParaRPr lang="en-US" altLang="zh-TW" dirty="0"/>
           </a:p>
         </p:txBody>
       </p:sp>

</xml_diff>

<commit_message>
No shitty timer anymore.
</commit_message>
<xml_diff>
--- a/group19.pptx
+++ b/group19.pptx
@@ -5,14 +5,15 @@
     <p:sldMasterId id="2147483660" r:id="rId1"/>
   </p:sldMasterIdLst>
   <p:notesMasterIdLst>
-    <p:notesMasterId r:id="rId7"/>
+    <p:notesMasterId r:id="rId8"/>
   </p:notesMasterIdLst>
   <p:sldIdLst>
     <p:sldId id="256" r:id="rId2"/>
     <p:sldId id="258" r:id="rId3"/>
     <p:sldId id="261" r:id="rId4"/>
     <p:sldId id="260" r:id="rId5"/>
-    <p:sldId id="257" r:id="rId6"/>
+    <p:sldId id="263" r:id="rId6"/>
+    <p:sldId id="262" r:id="rId7"/>
   </p:sldIdLst>
   <p:sldSz cx="12192000" cy="6858000"/>
   <p:notesSz cx="6858000" cy="9144000"/>
@@ -655,6 +656,90 @@
     <p:extLst>
       <p:ext uri="{BB962C8B-B14F-4D97-AF65-F5344CB8AC3E}">
         <p14:creationId xmlns:p14="http://schemas.microsoft.com/office/powerpoint/2010/main" val="1761270733"/>
+      </p:ext>
+    </p:extLst>
+  </p:cSld>
+  <p:clrMapOvr>
+    <a:masterClrMapping/>
+  </p:clrMapOvr>
+</p:notes>
+</file>
+
+<file path=ppt/notesSlides/notesSlide3.xml><?xml version="1.0" encoding="utf-8"?>
+<p:notes xmlns:a="http://schemas.openxmlformats.org/drawingml/2006/main" xmlns:r="http://schemas.openxmlformats.org/officeDocument/2006/relationships" xmlns:p="http://schemas.openxmlformats.org/presentationml/2006/main">
+  <p:cSld>
+    <p:spTree>
+      <p:nvGrpSpPr>
+        <p:cNvPr id="1" name=""/>
+        <p:cNvGrpSpPr/>
+        <p:nvPr/>
+      </p:nvGrpSpPr>
+      <p:grpSpPr>
+        <a:xfrm>
+          <a:off x="0" y="0"/>
+          <a:ext cx="0" cy="0"/>
+          <a:chOff x="0" y="0"/>
+          <a:chExt cx="0" cy="0"/>
+        </a:xfrm>
+      </p:grpSpPr>
+      <p:sp>
+        <p:nvSpPr>
+          <p:cNvPr id="2" name="投影片影像版面配置區 1"/>
+          <p:cNvSpPr>
+            <a:spLocks noGrp="1" noRot="1" noChangeAspect="1"/>
+          </p:cNvSpPr>
+          <p:nvPr>
+            <p:ph type="sldImg"/>
+          </p:nvPr>
+        </p:nvSpPr>
+        <p:spPr/>
+      </p:sp>
+      <p:sp>
+        <p:nvSpPr>
+          <p:cNvPr id="3" name="備忘稿版面配置區 2"/>
+          <p:cNvSpPr>
+            <a:spLocks noGrp="1"/>
+          </p:cNvSpPr>
+          <p:nvPr>
+            <p:ph type="body" idx="1"/>
+          </p:nvPr>
+        </p:nvSpPr>
+        <p:spPr/>
+        <p:txBody>
+          <a:bodyPr/>
+          <a:lstStyle/>
+          <a:p>
+            <a:endParaRPr lang="en-US" altLang="zh-TW" b="1" dirty="0"/>
+          </a:p>
+        </p:txBody>
+      </p:sp>
+      <p:sp>
+        <p:nvSpPr>
+          <p:cNvPr id="4" name="投影片編號版面配置區 3"/>
+          <p:cNvSpPr>
+            <a:spLocks noGrp="1"/>
+          </p:cNvSpPr>
+          <p:nvPr>
+            <p:ph type="sldNum" sz="quarter" idx="5"/>
+          </p:nvPr>
+        </p:nvSpPr>
+        <p:spPr/>
+        <p:txBody>
+          <a:bodyPr/>
+          <a:lstStyle/>
+          <a:p>
+            <a:fld id="{518DE363-99AB-4E1F-93EC-5DED477F94EE}" type="slidenum">
+              <a:rPr lang="zh-TW" altLang="en-US" smtClean="0"/>
+              <a:t>5</a:t>
+            </a:fld>
+            <a:endParaRPr lang="zh-TW" altLang="en-US"/>
+          </a:p>
+        </p:txBody>
+      </p:sp>
+    </p:spTree>
+    <p:extLst>
+      <p:ext uri="{BB962C8B-B14F-4D97-AF65-F5344CB8AC3E}">
+        <p14:creationId xmlns:p14="http://schemas.microsoft.com/office/powerpoint/2010/main" val="3530563750"/>
       </p:ext>
     </p:extLst>
   </p:cSld>
@@ -4636,67 +4721,67 @@
           <a:lstStyle/>
           <a:p>
             <a:r>
-              <a:rPr lang="zh-TW" altLang="en-US" sz="2400" dirty="0"/>
+              <a:rPr lang="zh-TW" altLang="en-US" sz="2400" b="1" dirty="0"/>
               <a:t>鍵盤上下左右移動角色 </a:t>
             </a:r>
             <a:r>
-              <a:rPr lang="en-US" altLang="zh-TW" sz="2400" dirty="0"/>
+              <a:rPr lang="en-US" altLang="zh-TW" sz="2400" b="1" dirty="0"/>
               <a:t>ESC</a:t>
             </a:r>
             <a:r>
-              <a:rPr lang="zh-TW" altLang="en-US" sz="2400" dirty="0"/>
+              <a:rPr lang="zh-TW" altLang="en-US" sz="2400" b="1" dirty="0"/>
               <a:t> 離開</a:t>
             </a:r>
-            <a:endParaRPr lang="en-US" altLang="zh-TW" sz="2400" dirty="0"/>
-          </a:p>
-          <a:p>
-            <a:r>
-              <a:rPr lang="zh-TW" altLang="en-US" sz="2400" dirty="0"/>
+            <a:endParaRPr lang="en-US" altLang="zh-TW" sz="2400" b="1" dirty="0"/>
+          </a:p>
+          <a:p>
+            <a:r>
+              <a:rPr lang="zh-TW" altLang="en-US" sz="2400" b="1" dirty="0"/>
               <a:t>若木桶旁有空間則可以被推動</a:t>
             </a:r>
-            <a:endParaRPr lang="en-US" altLang="zh-TW" sz="2400" dirty="0"/>
-          </a:p>
-          <a:p>
-            <a:r>
-              <a:rPr lang="zh-TW" altLang="en-US" sz="2400" dirty="0"/>
+            <a:endParaRPr lang="en-US" altLang="zh-TW" sz="2400" b="1" dirty="0"/>
+          </a:p>
+          <a:p>
+            <a:r>
+              <a:rPr lang="zh-TW" altLang="en-US" sz="2400" b="1" dirty="0"/>
               <a:t>不能一次推動兩個木桶</a:t>
             </a:r>
-            <a:endParaRPr lang="en-US" altLang="zh-TW" sz="2400" dirty="0"/>
-          </a:p>
-          <a:p>
-            <a:r>
-              <a:rPr lang="zh-TW" altLang="en-US" sz="2400" dirty="0"/>
+            <a:endParaRPr lang="en-US" altLang="zh-TW" sz="2400" b="1" dirty="0"/>
+          </a:p>
+          <a:p>
+            <a:r>
+              <a:rPr lang="zh-TW" altLang="en-US" sz="2400" b="1" dirty="0"/>
               <a:t>遇到敵人可以推動，要消耗一次移動次數</a:t>
             </a:r>
-            <a:endParaRPr lang="en-US" altLang="zh-TW" sz="2400" dirty="0"/>
-          </a:p>
-          <a:p>
-            <a:r>
-              <a:rPr lang="zh-TW" altLang="en-US" sz="2400" dirty="0"/>
+            <a:endParaRPr lang="en-US" altLang="zh-TW" sz="2400" b="1" dirty="0"/>
+          </a:p>
+          <a:p>
+            <a:r>
+              <a:rPr lang="zh-TW" altLang="en-US" sz="2400" b="1" dirty="0"/>
               <a:t>若將敵人推向牆壁或尖刺可以消滅敵人</a:t>
             </a:r>
-            <a:endParaRPr lang="en-US" altLang="zh-TW" sz="2400" dirty="0"/>
-          </a:p>
-          <a:p>
-            <a:r>
-              <a:rPr lang="zh-TW" altLang="en-US" sz="2400" dirty="0"/>
+            <a:endParaRPr lang="en-US" altLang="zh-TW" sz="2400" b="1" dirty="0"/>
+          </a:p>
+          <a:p>
+            <a:r>
+              <a:rPr lang="zh-TW" altLang="en-US" sz="2400" b="1" dirty="0"/>
               <a:t>每個關卡有限定移動次數</a:t>
             </a:r>
             <a:br>
-              <a:rPr lang="en-US" altLang="zh-TW" sz="2400" dirty="0"/>
+              <a:rPr lang="en-US" altLang="zh-TW" sz="2400" b="1" dirty="0"/>
             </a:br>
             <a:r>
-              <a:rPr lang="zh-TW" altLang="en-US" sz="2400" dirty="0"/>
+              <a:rPr lang="zh-TW" altLang="en-US" sz="2400" b="1" dirty="0"/>
               <a:t>次數用盡則關卡重啟</a:t>
             </a:r>
-            <a:endParaRPr lang="en-US" altLang="zh-TW" sz="2400" dirty="0"/>
-          </a:p>
-          <a:p>
-            <a:r>
-              <a:rPr lang="zh-TW" altLang="en-US" sz="2400" dirty="0"/>
+            <a:endParaRPr lang="en-US" altLang="zh-TW" sz="2400" b="1" dirty="0"/>
+          </a:p>
+          <a:p>
+            <a:r>
+              <a:rPr lang="zh-TW" altLang="en-US" sz="2400" b="1" dirty="0"/>
               <a:t>到達樓梯則進入下一層</a:t>
             </a:r>
-            <a:endParaRPr lang="en-US" altLang="zh-TW" sz="2400" dirty="0"/>
+            <a:endParaRPr lang="en-US" altLang="zh-TW" sz="2400" b="1" dirty="0"/>
           </a:p>
           <a:p>
             <a:endParaRPr lang="en-US" altLang="zh-TW" dirty="0"/>
@@ -4899,8 +4984,8 @@
         </p:nvSpPr>
         <p:spPr>
           <a:xfrm>
-            <a:off x="1020795" y="2030003"/>
-            <a:ext cx="5666679" cy="4278094"/>
+            <a:off x="1020815" y="1722756"/>
+            <a:ext cx="5666679" cy="5186035"/>
           </a:xfrm>
           <a:prstGeom prst="rect">
             <a:avLst/>
@@ -4983,7 +5068,15 @@
             </a:br>
             <a:r>
               <a:rPr lang="zh-TW" altLang="en-US" b="1" dirty="0"/>
-              <a:t>視窗創建後傳送，載入</a:t>
+              <a:t>視窗創建後傳送，</a:t>
+            </a:r>
+            <a:r>
+              <a:rPr lang="en-US" altLang="zh-TW" b="1" dirty="0"/>
+              <a:t>LoadBitmapHandlers</a:t>
+            </a:r>
+            <a:r>
+              <a:rPr lang="zh-TW" altLang="en-US" b="1" dirty="0"/>
+              <a:t> 在遊戲開始時讀取會重複用到的</a:t>
             </a:r>
             <a:r>
               <a:rPr lang="en-US" altLang="zh-TW" b="1" dirty="0"/>
@@ -4991,11 +5084,26 @@
             </a:r>
             <a:r>
               <a:rPr lang="zh-TW" altLang="en-US" b="1" dirty="0"/>
-              <a:t>並取得它們的</a:t>
+              <a:t>與</a:t>
             </a:r>
             <a:r>
               <a:rPr lang="en-US" altLang="zh-TW" b="1" dirty="0"/>
-              <a:t>handle</a:t>
+              <a:t>Mask</a:t>
+            </a:r>
+            <a:r>
+              <a:rPr lang="zh-TW" altLang="en-US" b="1" dirty="0"/>
+              <a:t>，</a:t>
+            </a:r>
+            <a:br>
+              <a:rPr lang="en-US" altLang="zh-TW" b="1" dirty="0"/>
+            </a:br>
+            <a:r>
+              <a:rPr lang="zh-TW" altLang="en-US" b="1" dirty="0"/>
+              <a:t>取得他們的</a:t>
+            </a:r>
+            <a:r>
+              <a:rPr lang="en-US" altLang="zh-TW" b="1" dirty="0"/>
+              <a:t>Handle</a:t>
             </a:r>
             <a:r>
               <a:rPr lang="zh-TW" altLang="en-US" b="1" dirty="0"/>
@@ -5055,7 +5163,27 @@
             </a:r>
             <a:r>
               <a:rPr lang="zh-TW" altLang="en-US" b="1" dirty="0"/>
-              <a:t>，依據遊戲邏輯修改狀態。</a:t>
+              <a:t>，依據遊戲邏輯 </a:t>
+            </a:r>
+            <a:r>
+              <a:rPr lang="en-US" altLang="zh-TW" dirty="0"/>
+              <a:t>(</a:t>
+            </a:r>
+            <a:r>
+              <a:rPr lang="zh-TW" altLang="en-US" b="1" dirty="0"/>
+              <a:t> </a:t>
+            </a:r>
+            <a:r>
+              <a:rPr lang="en-US" altLang="zh-TW" dirty="0"/>
+              <a:t>ProcessMovement )</a:t>
+            </a:r>
+            <a:r>
+              <a:rPr lang="zh-TW" altLang="en-US" dirty="0"/>
+              <a:t> </a:t>
+            </a:r>
+            <a:r>
+              <a:rPr lang="zh-TW" altLang="en-US" b="1" dirty="0"/>
+              <a:t>修改狀態。</a:t>
             </a:r>
           </a:p>
           <a:p>
@@ -5076,6 +5204,48 @@
             <a:r>
               <a:rPr lang="zh-TW" altLang="en-US" b="1" dirty="0"/>
               <a:t>使用計時器處理動畫與過場。</a:t>
+            </a:r>
+            <a:endParaRPr lang="en-US" altLang="zh-TW" b="1" dirty="0"/>
+          </a:p>
+          <a:p>
+            <a:pPr marL="139950" indent="-342900">
+              <a:spcBef>
+                <a:spcPts val="600"/>
+              </a:spcBef>
+              <a:buFont typeface="+mj-lt"/>
+              <a:buAutoNum type="arabicPeriod"/>
+            </a:pPr>
+            <a:r>
+              <a:rPr lang="en-US" altLang="zh-TW" b="1" dirty="0"/>
+              <a:t>ResetGame </a:t>
+            </a:r>
+            <a:r>
+              <a:rPr lang="zh-TW" altLang="en-US" b="1" dirty="0"/>
+              <a:t>處理每次關卡開始前的重設，包含起始</a:t>
+            </a:r>
+            <a:r>
+              <a:rPr lang="en-US" altLang="zh-TW" b="1" dirty="0"/>
+              <a:t>	</a:t>
+            </a:r>
+            <a:r>
+              <a:rPr lang="zh-TW" altLang="en-US" b="1" dirty="0"/>
+              <a:t>位置、</a:t>
+            </a:r>
+            <a:r>
+              <a:rPr lang="en-US" altLang="zh-TW" b="1" dirty="0"/>
+              <a:t>Tile </a:t>
+            </a:r>
+            <a:r>
+              <a:rPr lang="zh-TW" altLang="en-US" b="1" dirty="0"/>
+              <a:t>狀態、</a:t>
+            </a:r>
+            <a:r>
+              <a:rPr lang="en-US" altLang="zh-TW" b="1" dirty="0"/>
+              <a:t>Timer</a:t>
+            </a:r>
+            <a:r>
+              <a:rPr lang="zh-TW" altLang="en-US" b="1" dirty="0"/>
+              <a:t>。</a:t>
             </a:r>
             <a:endParaRPr lang="en-US" altLang="zh-TW" b="1" dirty="0"/>
           </a:p>
@@ -6706,23 +6876,23 @@
           </a:p>
           <a:p>
             <a:r>
-              <a:rPr lang="en-US" altLang="zh-TW" sz="2400" dirty="0"/>
-              <a:t>Resource Compiler</a:t>
+              <a:rPr lang="en-US" altLang="zh-TW" sz="2400" b="1" dirty="0"/>
+              <a:t>Masm32 - Resource Compiler</a:t>
+            </a:r>
+            <a:r>
+              <a:rPr lang="zh-TW" altLang="en-US" sz="2400" b="1" dirty="0"/>
+              <a:t> </a:t>
+            </a:r>
+            <a:r>
+              <a:rPr lang="en-US" altLang="zh-TW" sz="2400" b="1" dirty="0"/>
+              <a:t>\</a:t>
             </a:r>
             <a:r>
               <a:rPr lang="zh-TW" altLang="en-US" sz="2400" dirty="0"/>
               <a:t> </a:t>
             </a:r>
             <a:r>
-              <a:rPr lang="en-US" altLang="zh-TW" sz="2400" dirty="0"/>
-              <a:t>\</a:t>
-            </a:r>
-            <a:r>
-              <a:rPr lang="zh-TW" altLang="en-US" sz="2400" dirty="0"/>
-              <a:t> </a:t>
-            </a:r>
-            <a:r>
-              <a:rPr lang="en-US" altLang="zh-TW" sz="2400" dirty="0"/>
+              <a:rPr lang="en-US" altLang="zh-TW" sz="2400" b="1" dirty="0"/>
               <a:t>Resource To Object Converter</a:t>
             </a:r>
           </a:p>
@@ -6998,6 +7168,57 @@
           </a:prstGeom>
         </p:spPr>
       </p:pic>
+      <p:sp>
+        <p:nvSpPr>
+          <p:cNvPr id="7" name="矩形 6">
+            <a:hlinkClick r:id="rId4" action="ppaction://hlinkfile"/>
+            <a:extLst>
+              <a:ext uri="{FF2B5EF4-FFF2-40B4-BE49-F238E27FC236}">
+                <a16:creationId xmlns:a16="http://schemas.microsoft.com/office/drawing/2014/main" id="{882530F2-74B2-4D6C-8CFE-6861F8CE8803}"/>
+              </a:ext>
+            </a:extLst>
+          </p:cNvPr>
+          <p:cNvSpPr/>
+          <p:nvPr/>
+        </p:nvSpPr>
+        <p:spPr>
+          <a:xfrm>
+            <a:off x="8597643" y="4494139"/>
+            <a:ext cx="3312697" cy="2179035"/>
+          </a:xfrm>
+          <a:prstGeom prst="rect">
+            <a:avLst/>
+          </a:prstGeom>
+          <a:noFill/>
+          <a:ln>
+            <a:noFill/>
+          </a:ln>
+        </p:spPr>
+        <p:style>
+          <a:lnRef idx="2">
+            <a:schemeClr val="accent1">
+              <a:shade val="50000"/>
+            </a:schemeClr>
+          </a:lnRef>
+          <a:fillRef idx="1">
+            <a:schemeClr val="accent1"/>
+          </a:fillRef>
+          <a:effectRef idx="0">
+            <a:schemeClr val="accent1"/>
+          </a:effectRef>
+          <a:fontRef idx="minor">
+            <a:schemeClr val="lt1"/>
+          </a:fontRef>
+        </p:style>
+        <p:txBody>
+          <a:bodyPr rtlCol="0" anchor="ctr"/>
+          <a:lstStyle/>
+          <a:p>
+            <a:pPr algn="ctr"/>
+            <a:endParaRPr lang="zh-TW" altLang="en-US"/>
+          </a:p>
+        </p:txBody>
+      </p:sp>
     </p:spTree>
     <p:extLst>
       <p:ext uri="{BB962C8B-B14F-4D97-AF65-F5344CB8AC3E}">
@@ -7012,7 +7233,7 @@
 </file>
 
 <file path=ppt/slides/slide5.xml><?xml version="1.0" encoding="utf-8"?>
-<p:sld xmlns:a="http://schemas.openxmlformats.org/drawingml/2006/main" xmlns:r="http://schemas.openxmlformats.org/officeDocument/2006/relationships" xmlns:p="http://schemas.openxmlformats.org/presentationml/2006/main">
+<p:sld xmlns:a="http://schemas.openxmlformats.org/drawingml/2006/main" xmlns:r="http://schemas.openxmlformats.org/officeDocument/2006/relationships" xmlns:p="http://schemas.openxmlformats.org/presentationml/2006/main" show="0">
   <p:cSld>
     <p:spTree>
       <p:nvGrpSpPr>
@@ -7030,10 +7251,10 @@
       </p:grpSpPr>
       <p:sp>
         <p:nvSpPr>
-          <p:cNvPr id="10" name="標題 9">
+          <p:cNvPr id="2" name="標題 1">
             <a:extLst>
               <a:ext uri="{FF2B5EF4-FFF2-40B4-BE49-F238E27FC236}">
-                <a16:creationId xmlns:a16="http://schemas.microsoft.com/office/drawing/2014/main" id="{E6BF08EF-64DA-475E-B04F-36B6CD7D6F02}"/>
+                <a16:creationId xmlns:a16="http://schemas.microsoft.com/office/drawing/2014/main" id="{0988D19D-934E-4CE3-869A-50A478611572}"/>
               </a:ext>
             </a:extLst>
           </p:cNvPr>
@@ -7046,18 +7267,19 @@
         </p:nvSpPr>
         <p:spPr>
           <a:xfrm>
-            <a:off x="1371600" y="2686050"/>
-            <a:ext cx="9601200" cy="1485900"/>
+            <a:off x="1371600" y="685800"/>
+            <a:ext cx="4128986" cy="1485900"/>
           </a:xfrm>
         </p:spPr>
         <p:txBody>
           <a:bodyPr anchor="ctr"/>
           <a:lstStyle/>
           <a:p>
-            <a:pPr algn="ctr"/>
-            <a:r>
-              <a:rPr lang="en-US" altLang="zh-TW" dirty="0"/>
-              <a:t>DEMO</a:t>
+            <a:r>
+              <a:rPr lang="zh-TW" altLang="en-US" dirty="0">
+                <a:latin typeface="微軟正黑體" panose="020B0604030504040204" pitchFamily="34" charset="-120"/>
+              </a:rPr>
+              <a:t>程式架構與流程</a:t>
             </a:r>
             <a:endParaRPr lang="zh-TW" altLang="en-US" dirty="0"/>
           </a:p>
@@ -7065,11 +7287,435 @@
       </p:sp>
       <p:sp>
         <p:nvSpPr>
-          <p:cNvPr id="2" name="矩形 1">
-            <a:hlinkClick r:id="rId2" action="ppaction://hlinkfile"/>
+          <p:cNvPr id="4" name="文字方塊 3">
             <a:extLst>
               <a:ext uri="{FF2B5EF4-FFF2-40B4-BE49-F238E27FC236}">
-                <a16:creationId xmlns:a16="http://schemas.microsoft.com/office/drawing/2014/main" id="{2BAD1A9C-9205-4AB6-9B4F-5807EB4CEBE6}"/>
+                <a16:creationId xmlns:a16="http://schemas.microsoft.com/office/drawing/2014/main" id="{71695F58-16DD-406C-BAB5-B1CC7640D13D}"/>
+              </a:ext>
+            </a:extLst>
+          </p:cNvPr>
+          <p:cNvSpPr txBox="1"/>
+          <p:nvPr/>
+        </p:nvSpPr>
+        <p:spPr>
+          <a:xfrm>
+            <a:off x="1131230" y="2171700"/>
+            <a:ext cx="10588329" cy="3447098"/>
+          </a:xfrm>
+          <a:prstGeom prst="rect">
+            <a:avLst/>
+          </a:prstGeom>
+          <a:noFill/>
+        </p:spPr>
+        <p:txBody>
+          <a:bodyPr wrap="square" rtlCol="0">
+            <a:spAutoFit/>
+          </a:bodyPr>
+          <a:lstStyle/>
+          <a:p>
+            <a:pPr marL="342900" indent="-342900">
+              <a:spcBef>
+                <a:spcPts val="1200"/>
+              </a:spcBef>
+              <a:buFont typeface="+mj-lt"/>
+              <a:buAutoNum type="arabicPeriod"/>
+            </a:pPr>
+            <a:r>
+              <a:rPr lang="zh-TW" altLang="en-US" sz="2400" b="1" dirty="0"/>
+              <a:t>使用</a:t>
+            </a:r>
+            <a:r>
+              <a:rPr lang="en-US" altLang="zh-TW" sz="2400" b="1" dirty="0"/>
+              <a:t>RC.exe</a:t>
+            </a:r>
+            <a:r>
+              <a:rPr lang="zh-TW" altLang="en-US" sz="2400" b="1" dirty="0"/>
+              <a:t>將</a:t>
+            </a:r>
+            <a:r>
+              <a:rPr lang="en-US" altLang="zh-TW" sz="2400" b="1" dirty="0"/>
+              <a:t>BMP</a:t>
+            </a:r>
+            <a:r>
+              <a:rPr lang="zh-TW" altLang="en-US" sz="2400" b="1" dirty="0"/>
+              <a:t>檔編譯成</a:t>
+            </a:r>
+            <a:r>
+              <a:rPr lang="en-US" altLang="zh-TW" sz="2400" b="1" dirty="0"/>
+              <a:t>Resource object</a:t>
+            </a:r>
+            <a:r>
+              <a:rPr lang="zh-TW" altLang="en-US" sz="2400" b="1" dirty="0"/>
+              <a:t>，並在編譯時</a:t>
+            </a:r>
+            <a:r>
+              <a:rPr lang="en-US" altLang="zh-TW" sz="2400" b="1" dirty="0"/>
+              <a:t>LINK</a:t>
+            </a:r>
+            <a:r>
+              <a:rPr lang="zh-TW" altLang="en-US" sz="2400" b="1" dirty="0"/>
+              <a:t>到主程式中。</a:t>
+            </a:r>
+            <a:endParaRPr lang="en-US" altLang="zh-TW" sz="2400" b="1" dirty="0"/>
+          </a:p>
+          <a:p>
+            <a:pPr marL="342900" indent="-342900">
+              <a:spcBef>
+                <a:spcPts val="1200"/>
+              </a:spcBef>
+              <a:buFont typeface="+mj-lt"/>
+              <a:buAutoNum type="arabicPeriod"/>
+            </a:pPr>
+            <a:r>
+              <a:rPr lang="zh-TW" altLang="en-US" sz="2400" b="1" dirty="0"/>
+              <a:t>定義</a:t>
+            </a:r>
+            <a:r>
+              <a:rPr lang="en-US" altLang="zh-TW" sz="2400" b="1" dirty="0"/>
+              <a:t>WNDCLASS STRUCT</a:t>
+            </a:r>
+            <a:r>
+              <a:rPr lang="zh-TW" altLang="en-US" sz="2400" b="1" dirty="0"/>
+              <a:t>的內容決定多個視窗參數，包含外觀、</a:t>
+            </a:r>
+            <a:r>
+              <a:rPr lang="en-US" altLang="zh-TW" sz="2400" b="1" dirty="0"/>
+              <a:t>ICON</a:t>
+            </a:r>
+            <a:r>
+              <a:rPr lang="zh-TW" altLang="en-US" sz="2400" b="1" dirty="0"/>
+              <a:t>、名稱。</a:t>
+            </a:r>
+          </a:p>
+          <a:p>
+            <a:pPr marL="342900" indent="-342900">
+              <a:spcBef>
+                <a:spcPts val="1200"/>
+              </a:spcBef>
+              <a:buFont typeface="+mj-lt"/>
+              <a:buAutoNum type="arabicPeriod"/>
+            </a:pPr>
+            <a:r>
+              <a:rPr lang="zh-TW" altLang="en-US" sz="2400" b="1" dirty="0"/>
+              <a:t>透過 </a:t>
+            </a:r>
+            <a:r>
+              <a:rPr lang="en-US" altLang="zh-TW" sz="2400" b="1" dirty="0"/>
+              <a:t>CreateWindow</a:t>
+            </a:r>
+            <a:r>
+              <a:rPr lang="zh-TW" altLang="en-US" sz="2400" b="1" dirty="0"/>
+              <a:t>建立視窗。</a:t>
+            </a:r>
+          </a:p>
+          <a:p>
+            <a:pPr marL="342900" indent="-342900">
+              <a:spcBef>
+                <a:spcPts val="1200"/>
+              </a:spcBef>
+              <a:buFont typeface="+mj-lt"/>
+              <a:buAutoNum type="arabicPeriod"/>
+            </a:pPr>
+            <a:r>
+              <a:rPr lang="zh-TW" altLang="en-US" sz="2400" b="1" dirty="0"/>
+              <a:t>透過</a:t>
+            </a:r>
+            <a:r>
+              <a:rPr lang="en-US" altLang="zh-TW" sz="2400" b="1" dirty="0"/>
+              <a:t>WIN API</a:t>
+            </a:r>
+            <a:r>
+              <a:rPr lang="zh-TW" altLang="en-US" sz="2400" b="1" dirty="0"/>
+              <a:t>的事件迴圈，處理重繪、鍵盤事件。</a:t>
+            </a:r>
+            <a:endParaRPr lang="en-US" altLang="zh-TW" sz="2400" b="1" dirty="0"/>
+          </a:p>
+          <a:p>
+            <a:pPr marL="342900" indent="-342900">
+              <a:spcBef>
+                <a:spcPts val="1200"/>
+              </a:spcBef>
+              <a:buFont typeface="+mj-lt"/>
+              <a:buAutoNum type="arabicPeriod"/>
+            </a:pPr>
+            <a:r>
+              <a:rPr lang="en-US" altLang="zh-TW" sz="2400" b="1" dirty="0"/>
+              <a:t>LoadBitmapHandlers</a:t>
+            </a:r>
+            <a:r>
+              <a:rPr lang="zh-TW" altLang="en-US" sz="2400" b="1" dirty="0"/>
+              <a:t> 在遊戲開始時讀取會重複用到的</a:t>
+            </a:r>
+            <a:r>
+              <a:rPr lang="en-US" altLang="zh-TW" sz="2400" b="1" dirty="0"/>
+              <a:t>Bitmaps</a:t>
+            </a:r>
+            <a:r>
+              <a:rPr lang="zh-TW" altLang="en-US" sz="2400" b="1" dirty="0"/>
+              <a:t>與</a:t>
+            </a:r>
+            <a:r>
+              <a:rPr lang="en-US" altLang="zh-TW" sz="2400" b="1" dirty="0"/>
+              <a:t>Mask</a:t>
+            </a:r>
+            <a:r>
+              <a:rPr lang="zh-TW" altLang="en-US" sz="2400" b="1" dirty="0"/>
+              <a:t>，</a:t>
+            </a:r>
+            <a:br>
+              <a:rPr lang="en-US" altLang="zh-TW" sz="2400" b="1" dirty="0"/>
+            </a:br>
+            <a:r>
+              <a:rPr lang="zh-TW" altLang="en-US" sz="2400" b="1" dirty="0"/>
+              <a:t>取得他們的</a:t>
+            </a:r>
+            <a:r>
+              <a:rPr lang="en-US" altLang="zh-TW" sz="2400" b="1" dirty="0"/>
+              <a:t>Handle</a:t>
+            </a:r>
+            <a:r>
+              <a:rPr lang="zh-TW" altLang="en-US" sz="2400" b="1" dirty="0"/>
+              <a:t>。</a:t>
+            </a:r>
+            <a:endParaRPr lang="en-US" altLang="zh-TW" sz="2400" b="1" dirty="0"/>
+          </a:p>
+          <a:p>
+            <a:pPr marL="342900" indent="-342900">
+              <a:spcBef>
+                <a:spcPts val="1200"/>
+              </a:spcBef>
+              <a:buFont typeface="+mj-lt"/>
+              <a:buAutoNum type="arabicPeriod"/>
+            </a:pPr>
+            <a:r>
+              <a:rPr lang="en-US" altLang="zh-TW" sz="2400" b="1" dirty="0"/>
+              <a:t>ResetGame </a:t>
+            </a:r>
+            <a:r>
+              <a:rPr lang="zh-TW" altLang="en-US" sz="2400" b="1" dirty="0"/>
+              <a:t>處理每次關卡開始前的重設，包含起始位置、</a:t>
+            </a:r>
+            <a:r>
+              <a:rPr lang="en-US" altLang="zh-TW" sz="2400" b="1" dirty="0"/>
+              <a:t>Tile </a:t>
+            </a:r>
+            <a:r>
+              <a:rPr lang="zh-TW" altLang="en-US" sz="2400" b="1" dirty="0"/>
+              <a:t>狀態、</a:t>
+            </a:r>
+            <a:r>
+              <a:rPr lang="en-US" altLang="zh-TW" sz="2400" b="1" dirty="0"/>
+              <a:t>Timer</a:t>
+            </a:r>
+            <a:r>
+              <a:rPr lang="zh-TW" altLang="en-US" sz="2400" b="1" dirty="0"/>
+              <a:t>。</a:t>
+            </a:r>
+            <a:endParaRPr lang="en-US" altLang="zh-TW" sz="2400" b="1" dirty="0"/>
+          </a:p>
+        </p:txBody>
+      </p:sp>
+    </p:spTree>
+    <p:extLst>
+      <p:ext uri="{BB962C8B-B14F-4D97-AF65-F5344CB8AC3E}">
+        <p14:creationId xmlns:p14="http://schemas.microsoft.com/office/powerpoint/2010/main" val="1361813538"/>
+      </p:ext>
+    </p:extLst>
+  </p:cSld>
+  <p:clrMapOvr>
+    <a:masterClrMapping/>
+  </p:clrMapOvr>
+</p:sld>
+</file>
+
+<file path=ppt/slides/slide6.xml><?xml version="1.0" encoding="utf-8"?>
+<p:sld xmlns:a="http://schemas.openxmlformats.org/drawingml/2006/main" xmlns:r="http://schemas.openxmlformats.org/officeDocument/2006/relationships" xmlns:p="http://schemas.openxmlformats.org/presentationml/2006/main" show="0">
+  <p:cSld>
+    <p:spTree>
+      <p:nvGrpSpPr>
+        <p:cNvPr id="1" name=""/>
+        <p:cNvGrpSpPr/>
+        <p:nvPr/>
+      </p:nvGrpSpPr>
+      <p:grpSpPr>
+        <a:xfrm>
+          <a:off x="0" y="0"/>
+          <a:ext cx="0" cy="0"/>
+          <a:chOff x="0" y="0"/>
+          <a:chExt cx="0" cy="0"/>
+        </a:xfrm>
+      </p:grpSpPr>
+      <p:sp>
+        <p:nvSpPr>
+          <p:cNvPr id="4" name="文字方塊 3">
+            <a:extLst>
+              <a:ext uri="{FF2B5EF4-FFF2-40B4-BE49-F238E27FC236}">
+                <a16:creationId xmlns:a16="http://schemas.microsoft.com/office/drawing/2014/main" id="{DCF88886-FD42-4DE8-8DDC-865F2C2BBF5C}"/>
+              </a:ext>
+            </a:extLst>
+          </p:cNvPr>
+          <p:cNvSpPr txBox="1"/>
+          <p:nvPr/>
+        </p:nvSpPr>
+        <p:spPr>
+          <a:xfrm>
+            <a:off x="1051741" y="1334792"/>
+            <a:ext cx="5666679" cy="4585871"/>
+          </a:xfrm>
+          <a:prstGeom prst="rect">
+            <a:avLst/>
+          </a:prstGeom>
+          <a:noFill/>
+        </p:spPr>
+        <p:txBody>
+          <a:bodyPr wrap="square" rtlCol="0">
+            <a:spAutoFit/>
+          </a:bodyPr>
+          <a:lstStyle/>
+          <a:p>
+            <a:r>
+              <a:rPr lang="en-US" altLang="zh-TW" sz="3200" b="1" dirty="0"/>
+              <a:t>Message loop</a:t>
+            </a:r>
+            <a:endParaRPr lang="zh-TW" altLang="en-US" sz="3200" b="1" dirty="0"/>
+          </a:p>
+          <a:p>
+            <a:pPr marL="540000" lvl="1" indent="-285750">
+              <a:spcBef>
+                <a:spcPts val="1200"/>
+              </a:spcBef>
+              <a:buFont typeface="Arial" panose="020B0604020202020204" pitchFamily="34" charset="0"/>
+              <a:buChar char="•"/>
+            </a:pPr>
+            <a:r>
+              <a:rPr lang="en-US" altLang="zh-TW" sz="2000" b="1" dirty="0"/>
+              <a:t>WM_CREATE</a:t>
+            </a:r>
+            <a:br>
+              <a:rPr lang="en-US" altLang="zh-TW" sz="2000" b="1" dirty="0"/>
+            </a:br>
+            <a:r>
+              <a:rPr lang="zh-TW" altLang="en-US" sz="2000" b="1" dirty="0"/>
+              <a:t>視窗創建後傳送，載入</a:t>
+            </a:r>
+            <a:r>
+              <a:rPr lang="en-US" altLang="zh-TW" sz="2000" b="1" dirty="0"/>
+              <a:t>Bitmaps</a:t>
+            </a:r>
+            <a:r>
+              <a:rPr lang="zh-TW" altLang="en-US" sz="2000" b="1" dirty="0"/>
+              <a:t>並取得它們的</a:t>
+            </a:r>
+            <a:r>
+              <a:rPr lang="en-US" altLang="zh-TW" sz="2000" b="1" dirty="0"/>
+              <a:t>handle</a:t>
+            </a:r>
+            <a:r>
+              <a:rPr lang="zh-TW" altLang="en-US" sz="2000" b="1" dirty="0"/>
+              <a:t>，供繪製畫面時使用。</a:t>
+            </a:r>
+          </a:p>
+          <a:p>
+            <a:pPr marL="540000" lvl="1" indent="-285750">
+              <a:spcBef>
+                <a:spcPts val="1200"/>
+              </a:spcBef>
+              <a:buFont typeface="Arial" panose="020B0604020202020204" pitchFamily="34" charset="0"/>
+              <a:buChar char="•"/>
+            </a:pPr>
+            <a:r>
+              <a:rPr lang="en-US" altLang="zh-TW" sz="2000" b="1" dirty="0"/>
+              <a:t>WM_PAINT</a:t>
+            </a:r>
+            <a:br>
+              <a:rPr lang="en-US" altLang="zh-TW" sz="2000" b="1" dirty="0"/>
+            </a:br>
+            <a:r>
+              <a:rPr lang="zh-TW" altLang="en-US" sz="2000" b="1" dirty="0"/>
+              <a:t>需要更新視窗時傳送，依照每個</a:t>
+            </a:r>
+            <a:r>
+              <a:rPr lang="en-US" altLang="zh-TW" sz="2000" b="1" dirty="0"/>
+              <a:t>Tile</a:t>
+            </a:r>
+            <a:r>
+              <a:rPr lang="zh-TW" altLang="en-US" sz="2000" b="1" dirty="0"/>
+              <a:t>的狀態處理遊戲內容的渲染。</a:t>
+            </a:r>
+          </a:p>
+          <a:p>
+            <a:pPr marL="540000" lvl="1" indent="-285750">
+              <a:spcBef>
+                <a:spcPts val="1200"/>
+              </a:spcBef>
+              <a:buFont typeface="Arial" panose="020B0604020202020204" pitchFamily="34" charset="0"/>
+              <a:buChar char="•"/>
+            </a:pPr>
+            <a:r>
+              <a:rPr lang="en-US" altLang="zh-TW" sz="2000" b="1" dirty="0"/>
+              <a:t>WM_KEYUP</a:t>
+            </a:r>
+            <a:br>
+              <a:rPr lang="en-US" altLang="zh-TW" sz="2000" b="1" dirty="0"/>
+            </a:br>
+            <a:r>
+              <a:rPr lang="zh-TW" altLang="en-US" sz="2000" b="1" dirty="0"/>
+              <a:t>針對按下按鍵的</a:t>
+            </a:r>
+            <a:r>
+              <a:rPr lang="en-US" altLang="zh-TW" sz="2000" b="1" dirty="0"/>
+              <a:t>Key Code</a:t>
+            </a:r>
+            <a:r>
+              <a:rPr lang="zh-TW" altLang="en-US" sz="2000" b="1" dirty="0"/>
+              <a:t>，依據遊戲邏輯 </a:t>
+            </a:r>
+            <a:r>
+              <a:rPr lang="en-US" altLang="zh-TW" sz="2000" b="1" dirty="0"/>
+              <a:t>(</a:t>
+            </a:r>
+            <a:r>
+              <a:rPr lang="zh-TW" altLang="en-US" sz="2000" b="1" dirty="0"/>
+              <a:t> </a:t>
+            </a:r>
+            <a:r>
+              <a:rPr lang="en-US" altLang="zh-TW" sz="2000" b="1" dirty="0"/>
+              <a:t>ProcessMovement )</a:t>
+            </a:r>
+            <a:r>
+              <a:rPr lang="zh-TW" altLang="en-US" sz="2000" b="1" dirty="0"/>
+              <a:t> 修改狀態。</a:t>
+            </a:r>
+          </a:p>
+          <a:p>
+            <a:pPr marL="540000" lvl="1" indent="-285750">
+              <a:spcBef>
+                <a:spcPts val="1200"/>
+              </a:spcBef>
+              <a:buFont typeface="Arial" panose="020B0604020202020204" pitchFamily="34" charset="0"/>
+              <a:buChar char="•"/>
+            </a:pPr>
+            <a:r>
+              <a:rPr lang="en-US" altLang="zh-TW" sz="2000" b="1" dirty="0"/>
+              <a:t>WM_TIMER</a:t>
+            </a:r>
+            <a:br>
+              <a:rPr lang="en-US" altLang="zh-TW" sz="2000" b="1" dirty="0"/>
+            </a:br>
+            <a:r>
+              <a:rPr lang="zh-TW" altLang="en-US" sz="2000" b="1" dirty="0"/>
+              <a:t>使用計時器處理動畫與過場。</a:t>
+            </a:r>
+            <a:endParaRPr lang="en-US" altLang="zh-TW" sz="2000" b="1" dirty="0"/>
+          </a:p>
+        </p:txBody>
+      </p:sp>
+      <p:sp>
+        <p:nvSpPr>
+          <p:cNvPr id="5" name="矩形: 圓角 4">
+            <a:extLst>
+              <a:ext uri="{FF2B5EF4-FFF2-40B4-BE49-F238E27FC236}">
+                <a16:creationId xmlns:a16="http://schemas.microsoft.com/office/drawing/2014/main" id="{64C79914-0107-45F7-980F-258DBEC79475}"/>
               </a:ext>
             </a:extLst>
           </p:cNvPr>
@@ -7078,14 +7724,15 @@
         </p:nvSpPr>
         <p:spPr>
           <a:xfrm>
-            <a:off x="5247861" y="3051313"/>
-            <a:ext cx="1848678" cy="755374"/>
-          </a:xfrm>
-          <a:prstGeom prst="rect">
-            <a:avLst/>
+            <a:off x="9846510" y="1014130"/>
+            <a:ext cx="1595019" cy="414619"/>
+          </a:xfrm>
+          <a:prstGeom prst="roundRect">
+            <a:avLst>
+              <a:gd name="adj" fmla="val 50000"/>
+            </a:avLst>
           </a:prstGeom>
-          <a:noFill/>
-          <a:ln>
+          <a:ln w="38100">
             <a:noFill/>
           </a:ln>
         </p:spPr>
@@ -7110,14 +7757,1471 @@
           <a:lstStyle/>
           <a:p>
             <a:pPr algn="ctr"/>
-            <a:endParaRPr lang="zh-TW" altLang="en-US"/>
+            <a:r>
+              <a:rPr lang="en-US" altLang="zh-TW" b="1" dirty="0"/>
+              <a:t>WM_KEYUP</a:t>
+            </a:r>
+            <a:endParaRPr lang="zh-TW" altLang="en-US" b="1" dirty="0"/>
+          </a:p>
+        </p:txBody>
+      </p:sp>
+      <p:sp>
+        <p:nvSpPr>
+          <p:cNvPr id="6" name="矩形: 圓角 5">
+            <a:extLst>
+              <a:ext uri="{FF2B5EF4-FFF2-40B4-BE49-F238E27FC236}">
+                <a16:creationId xmlns:a16="http://schemas.microsoft.com/office/drawing/2014/main" id="{EBFEE32A-7570-4D05-AF7E-447C21B66879}"/>
+              </a:ext>
+            </a:extLst>
+          </p:cNvPr>
+          <p:cNvSpPr/>
+          <p:nvPr/>
+        </p:nvSpPr>
+        <p:spPr>
+          <a:xfrm>
+            <a:off x="9799783" y="5162913"/>
+            <a:ext cx="1783976" cy="582706"/>
+          </a:xfrm>
+          <a:prstGeom prst="roundRect">
+            <a:avLst>
+              <a:gd name="adj" fmla="val 50000"/>
+            </a:avLst>
+          </a:prstGeom>
+          <a:ln w="38100">
+            <a:noFill/>
+          </a:ln>
+        </p:spPr>
+        <p:style>
+          <a:lnRef idx="2">
+            <a:schemeClr val="accent1">
+              <a:shade val="50000"/>
+            </a:schemeClr>
+          </a:lnRef>
+          <a:fillRef idx="1">
+            <a:schemeClr val="accent1"/>
+          </a:fillRef>
+          <a:effectRef idx="0">
+            <a:schemeClr val="accent1"/>
+          </a:effectRef>
+          <a:fontRef idx="minor">
+            <a:schemeClr val="lt1"/>
+          </a:fontRef>
+        </p:style>
+        <p:txBody>
+          <a:bodyPr rtlCol="0" anchor="ctr"/>
+          <a:lstStyle/>
+          <a:p>
+            <a:pPr algn="ctr"/>
+            <a:r>
+              <a:rPr lang="en-US" altLang="zh-TW" dirty="0"/>
+              <a:t>END</a:t>
+            </a:r>
+            <a:endParaRPr lang="zh-TW" altLang="en-US" dirty="0"/>
+          </a:p>
+        </p:txBody>
+      </p:sp>
+      <p:sp>
+        <p:nvSpPr>
+          <p:cNvPr id="7" name="流程圖: 決策 6">
+            <a:extLst>
+              <a:ext uri="{FF2B5EF4-FFF2-40B4-BE49-F238E27FC236}">
+                <a16:creationId xmlns:a16="http://schemas.microsoft.com/office/drawing/2014/main" id="{243E9045-8B31-4F3B-9723-B0D94A36CEAE}"/>
+              </a:ext>
+            </a:extLst>
+          </p:cNvPr>
+          <p:cNvSpPr/>
+          <p:nvPr/>
+        </p:nvSpPr>
+        <p:spPr>
+          <a:xfrm>
+            <a:off x="7034811" y="2205150"/>
+            <a:ext cx="1335741" cy="829238"/>
+          </a:xfrm>
+          <a:prstGeom prst="flowChartDecision">
+            <a:avLst/>
+          </a:prstGeom>
+          <a:ln w="38100">
+            <a:noFill/>
+          </a:ln>
+        </p:spPr>
+        <p:style>
+          <a:lnRef idx="2">
+            <a:schemeClr val="accent1">
+              <a:shade val="50000"/>
+            </a:schemeClr>
+          </a:lnRef>
+          <a:fillRef idx="1">
+            <a:schemeClr val="accent1"/>
+          </a:fillRef>
+          <a:effectRef idx="0">
+            <a:schemeClr val="accent1"/>
+          </a:effectRef>
+          <a:fontRef idx="minor">
+            <a:schemeClr val="lt1"/>
+          </a:fontRef>
+        </p:style>
+        <p:txBody>
+          <a:bodyPr rtlCol="0" anchor="ctr"/>
+          <a:lstStyle/>
+          <a:p>
+            <a:pPr algn="ctr"/>
+            <a:r>
+              <a:rPr lang="zh-TW" altLang="en-US" b="1" dirty="0"/>
+              <a:t>木桶</a:t>
+            </a:r>
+          </a:p>
+        </p:txBody>
+      </p:sp>
+      <p:sp>
+        <p:nvSpPr>
+          <p:cNvPr id="8" name="流程圖: 決策 7">
+            <a:extLst>
+              <a:ext uri="{FF2B5EF4-FFF2-40B4-BE49-F238E27FC236}">
+                <a16:creationId xmlns:a16="http://schemas.microsoft.com/office/drawing/2014/main" id="{5347A4AB-F8E8-483C-9ABB-CCAB9DCA146B}"/>
+              </a:ext>
+            </a:extLst>
+          </p:cNvPr>
+          <p:cNvSpPr/>
+          <p:nvPr/>
+        </p:nvSpPr>
+        <p:spPr>
+          <a:xfrm>
+            <a:off x="8510769" y="2205150"/>
+            <a:ext cx="1335741" cy="829238"/>
+          </a:xfrm>
+          <a:prstGeom prst="flowChartDecision">
+            <a:avLst/>
+          </a:prstGeom>
+          <a:ln w="38100">
+            <a:noFill/>
+          </a:ln>
+        </p:spPr>
+        <p:style>
+          <a:lnRef idx="2">
+            <a:schemeClr val="accent1">
+              <a:shade val="50000"/>
+            </a:schemeClr>
+          </a:lnRef>
+          <a:fillRef idx="1">
+            <a:schemeClr val="accent1"/>
+          </a:fillRef>
+          <a:effectRef idx="0">
+            <a:schemeClr val="accent1"/>
+          </a:effectRef>
+          <a:fontRef idx="minor">
+            <a:schemeClr val="lt1"/>
+          </a:fontRef>
+        </p:style>
+        <p:txBody>
+          <a:bodyPr rtlCol="0" anchor="ctr"/>
+          <a:lstStyle/>
+          <a:p>
+            <a:pPr algn="ctr"/>
+            <a:r>
+              <a:rPr lang="zh-TW" altLang="en-US" b="1" dirty="0"/>
+              <a:t>敵人</a:t>
+            </a:r>
+          </a:p>
+        </p:txBody>
+      </p:sp>
+      <p:sp>
+        <p:nvSpPr>
+          <p:cNvPr id="9" name="流程圖: 決策 8">
+            <a:extLst>
+              <a:ext uri="{FF2B5EF4-FFF2-40B4-BE49-F238E27FC236}">
+                <a16:creationId xmlns:a16="http://schemas.microsoft.com/office/drawing/2014/main" id="{31CDB41C-7AB5-46E1-9450-2E6CE5A0CF5C}"/>
+              </a:ext>
+            </a:extLst>
+          </p:cNvPr>
+          <p:cNvSpPr/>
+          <p:nvPr/>
+        </p:nvSpPr>
+        <p:spPr>
+          <a:xfrm>
+            <a:off x="9994006" y="2202619"/>
+            <a:ext cx="1335741" cy="829238"/>
+          </a:xfrm>
+          <a:prstGeom prst="flowChartDecision">
+            <a:avLst/>
+          </a:prstGeom>
+          <a:ln w="38100">
+            <a:noFill/>
+          </a:ln>
+        </p:spPr>
+        <p:style>
+          <a:lnRef idx="2">
+            <a:schemeClr val="accent1">
+              <a:shade val="50000"/>
+            </a:schemeClr>
+          </a:lnRef>
+          <a:fillRef idx="1">
+            <a:schemeClr val="accent1"/>
+          </a:fillRef>
+          <a:effectRef idx="0">
+            <a:schemeClr val="accent1"/>
+          </a:effectRef>
+          <a:fontRef idx="minor">
+            <a:schemeClr val="lt1"/>
+          </a:fontRef>
+        </p:style>
+        <p:txBody>
+          <a:bodyPr rtlCol="0" anchor="ctr"/>
+          <a:lstStyle/>
+          <a:p>
+            <a:pPr algn="ctr"/>
+            <a:r>
+              <a:rPr lang="zh-TW" altLang="en-US" b="1" dirty="0"/>
+              <a:t>階梯</a:t>
+            </a:r>
+          </a:p>
+        </p:txBody>
+      </p:sp>
+      <p:cxnSp>
+        <p:nvCxnSpPr>
+          <p:cNvPr id="10" name="接點: 肘形 9">
+            <a:extLst>
+              <a:ext uri="{FF2B5EF4-FFF2-40B4-BE49-F238E27FC236}">
+                <a16:creationId xmlns:a16="http://schemas.microsoft.com/office/drawing/2014/main" id="{4752DB59-AE8F-44E0-8BEB-FAEBEE150562}"/>
+              </a:ext>
+            </a:extLst>
+          </p:cNvPr>
+          <p:cNvCxnSpPr>
+            <a:stCxn id="7" idx="3"/>
+            <a:endCxn id="8" idx="0"/>
+          </p:cNvCxnSpPr>
+          <p:nvPr/>
+        </p:nvCxnSpPr>
+        <p:spPr>
+          <a:xfrm flipV="1">
+            <a:off x="8370552" y="2205150"/>
+            <a:ext cx="808088" cy="414619"/>
+          </a:xfrm>
+          <a:prstGeom prst="bentConnector4">
+            <a:avLst>
+              <a:gd name="adj1" fmla="val 8676"/>
+              <a:gd name="adj2" fmla="val 155135"/>
+            </a:avLst>
+          </a:prstGeom>
+          <a:ln w="38100">
+            <a:tailEnd type="triangle"/>
+          </a:ln>
+        </p:spPr>
+        <p:style>
+          <a:lnRef idx="1">
+            <a:schemeClr val="accent1"/>
+          </a:lnRef>
+          <a:fillRef idx="0">
+            <a:schemeClr val="accent1"/>
+          </a:fillRef>
+          <a:effectRef idx="0">
+            <a:schemeClr val="accent1"/>
+          </a:effectRef>
+          <a:fontRef idx="minor">
+            <a:schemeClr val="tx1"/>
+          </a:fontRef>
+        </p:style>
+      </p:cxnSp>
+      <p:cxnSp>
+        <p:nvCxnSpPr>
+          <p:cNvPr id="11" name="接點: 肘形 10">
+            <a:extLst>
+              <a:ext uri="{FF2B5EF4-FFF2-40B4-BE49-F238E27FC236}">
+                <a16:creationId xmlns:a16="http://schemas.microsoft.com/office/drawing/2014/main" id="{003B1EAB-078E-42C1-BB69-136FBF29064F}"/>
+              </a:ext>
+            </a:extLst>
+          </p:cNvPr>
+          <p:cNvCxnSpPr>
+            <a:cxnSpLocks/>
+            <a:stCxn id="8" idx="3"/>
+            <a:endCxn id="9" idx="0"/>
+          </p:cNvCxnSpPr>
+          <p:nvPr/>
+        </p:nvCxnSpPr>
+        <p:spPr>
+          <a:xfrm flipV="1">
+            <a:off x="9846510" y="2202619"/>
+            <a:ext cx="815367" cy="417150"/>
+          </a:xfrm>
+          <a:prstGeom prst="bentConnector4">
+            <a:avLst>
+              <a:gd name="adj1" fmla="val 9045"/>
+              <a:gd name="adj2" fmla="val 154800"/>
+            </a:avLst>
+          </a:prstGeom>
+          <a:ln w="38100">
+            <a:tailEnd type="triangle"/>
+          </a:ln>
+        </p:spPr>
+        <p:style>
+          <a:lnRef idx="1">
+            <a:schemeClr val="accent1"/>
+          </a:lnRef>
+          <a:fillRef idx="0">
+            <a:schemeClr val="accent1"/>
+          </a:fillRef>
+          <a:effectRef idx="0">
+            <a:schemeClr val="accent1"/>
+          </a:effectRef>
+          <a:fontRef idx="minor">
+            <a:schemeClr val="tx1"/>
+          </a:fontRef>
+        </p:style>
+      </p:cxnSp>
+      <p:cxnSp>
+        <p:nvCxnSpPr>
+          <p:cNvPr id="12" name="接點: 肘形 11">
+            <a:extLst>
+              <a:ext uri="{FF2B5EF4-FFF2-40B4-BE49-F238E27FC236}">
+                <a16:creationId xmlns:a16="http://schemas.microsoft.com/office/drawing/2014/main" id="{ADC58160-4853-465E-BD80-6AA20D843633}"/>
+              </a:ext>
+            </a:extLst>
+          </p:cNvPr>
+          <p:cNvCxnSpPr>
+            <a:cxnSpLocks/>
+            <a:stCxn id="5" idx="2"/>
+            <a:endCxn id="26" idx="0"/>
+          </p:cNvCxnSpPr>
+          <p:nvPr/>
+        </p:nvCxnSpPr>
+        <p:spPr>
+          <a:xfrm rot="5400000" flipH="1">
+            <a:off x="9262616" y="47345"/>
+            <a:ext cx="50074" cy="2712735"/>
+          </a:xfrm>
+          <a:prstGeom prst="bentConnector5">
+            <a:avLst>
+              <a:gd name="adj1" fmla="val -456524"/>
+              <a:gd name="adj2" fmla="val 50012"/>
+              <a:gd name="adj3" fmla="val 556524"/>
+            </a:avLst>
+          </a:prstGeom>
+          <a:ln w="38100">
+            <a:tailEnd type="triangle"/>
+          </a:ln>
+        </p:spPr>
+        <p:style>
+          <a:lnRef idx="1">
+            <a:schemeClr val="accent1"/>
+          </a:lnRef>
+          <a:fillRef idx="0">
+            <a:schemeClr val="accent1"/>
+          </a:fillRef>
+          <a:effectRef idx="0">
+            <a:schemeClr val="accent1"/>
+          </a:effectRef>
+          <a:fontRef idx="minor">
+            <a:schemeClr val="tx1"/>
+          </a:fontRef>
+        </p:style>
+      </p:cxnSp>
+      <p:sp>
+        <p:nvSpPr>
+          <p:cNvPr id="13" name="矩形 12">
+            <a:extLst>
+              <a:ext uri="{FF2B5EF4-FFF2-40B4-BE49-F238E27FC236}">
+                <a16:creationId xmlns:a16="http://schemas.microsoft.com/office/drawing/2014/main" id="{9192438F-0980-4D2B-A98A-3865BDC6C89E}"/>
+              </a:ext>
+            </a:extLst>
+          </p:cNvPr>
+          <p:cNvSpPr/>
+          <p:nvPr/>
+        </p:nvSpPr>
+        <p:spPr>
+          <a:xfrm>
+            <a:off x="10079205" y="3348846"/>
+            <a:ext cx="1854855" cy="645460"/>
+          </a:xfrm>
+          <a:prstGeom prst="rect">
+            <a:avLst/>
+          </a:prstGeom>
+          <a:ln w="38100">
+            <a:noFill/>
+          </a:ln>
+        </p:spPr>
+        <p:style>
+          <a:lnRef idx="2">
+            <a:schemeClr val="accent1">
+              <a:shade val="50000"/>
+            </a:schemeClr>
+          </a:lnRef>
+          <a:fillRef idx="1">
+            <a:schemeClr val="accent1"/>
+          </a:fillRef>
+          <a:effectRef idx="0">
+            <a:schemeClr val="accent1"/>
+          </a:effectRef>
+          <a:fontRef idx="minor">
+            <a:schemeClr val="lt1"/>
+          </a:fontRef>
+        </p:style>
+        <p:txBody>
+          <a:bodyPr rtlCol="0" anchor="ctr"/>
+          <a:lstStyle/>
+          <a:p>
+            <a:r>
+              <a:rPr lang="en-US" altLang="zh-TW" sz="1600" dirty="0"/>
+              <a:t>INC currentLevel</a:t>
+            </a:r>
+          </a:p>
+          <a:p>
+            <a:r>
+              <a:rPr lang="en-US" altLang="zh-TW" sz="1600" dirty="0"/>
+              <a:t>INVOKE</a:t>
+            </a:r>
+            <a:r>
+              <a:rPr lang="zh-TW" altLang="en-US" sz="1600" dirty="0"/>
+              <a:t> </a:t>
+            </a:r>
+            <a:r>
+              <a:rPr lang="en-US" altLang="zh-TW" sz="1600" dirty="0"/>
+              <a:t>ResetLevel</a:t>
+            </a:r>
+            <a:endParaRPr lang="zh-TW" altLang="en-US" sz="1600" dirty="0"/>
+          </a:p>
+        </p:txBody>
+      </p:sp>
+      <p:sp>
+        <p:nvSpPr>
+          <p:cNvPr id="14" name="流程圖: 決策 13">
+            <a:extLst>
+              <a:ext uri="{FF2B5EF4-FFF2-40B4-BE49-F238E27FC236}">
+                <a16:creationId xmlns:a16="http://schemas.microsoft.com/office/drawing/2014/main" id="{F1BAE2DB-CD95-4B4A-ADBB-FEC5E7022639}"/>
+              </a:ext>
+            </a:extLst>
+          </p:cNvPr>
+          <p:cNvSpPr/>
+          <p:nvPr/>
+        </p:nvSpPr>
+        <p:spPr>
+          <a:xfrm>
+            <a:off x="8510778" y="3137484"/>
+            <a:ext cx="1335732" cy="853935"/>
+          </a:xfrm>
+          <a:prstGeom prst="flowChartDecision">
+            <a:avLst/>
+          </a:prstGeom>
+          <a:ln w="38100">
+            <a:noFill/>
+          </a:ln>
+        </p:spPr>
+        <p:style>
+          <a:lnRef idx="2">
+            <a:schemeClr val="accent1">
+              <a:shade val="50000"/>
+            </a:schemeClr>
+          </a:lnRef>
+          <a:fillRef idx="1">
+            <a:schemeClr val="accent1"/>
+          </a:fillRef>
+          <a:effectRef idx="0">
+            <a:schemeClr val="accent1"/>
+          </a:effectRef>
+          <a:fontRef idx="minor">
+            <a:schemeClr val="lt1"/>
+          </a:fontRef>
+        </p:style>
+        <p:txBody>
+          <a:bodyPr rtlCol="0" anchor="ctr"/>
+          <a:lstStyle/>
+          <a:p>
+            <a:pPr algn="ctr"/>
+            <a:r>
+              <a:rPr lang="zh-TW" altLang="en-US" sz="1100" b="1" dirty="0"/>
+              <a:t>下一格是否可以移動</a:t>
+            </a:r>
+          </a:p>
+        </p:txBody>
+      </p:sp>
+      <p:sp>
+        <p:nvSpPr>
+          <p:cNvPr id="15" name="流程圖: 決策 14">
+            <a:extLst>
+              <a:ext uri="{FF2B5EF4-FFF2-40B4-BE49-F238E27FC236}">
+                <a16:creationId xmlns:a16="http://schemas.microsoft.com/office/drawing/2014/main" id="{165697E4-8883-47E5-A87F-FAF8BCCBB052}"/>
+              </a:ext>
+            </a:extLst>
+          </p:cNvPr>
+          <p:cNvSpPr/>
+          <p:nvPr/>
+        </p:nvSpPr>
+        <p:spPr>
+          <a:xfrm>
+            <a:off x="7034810" y="3147596"/>
+            <a:ext cx="1335741" cy="824194"/>
+          </a:xfrm>
+          <a:prstGeom prst="flowChartDecision">
+            <a:avLst/>
+          </a:prstGeom>
+          <a:ln w="38100">
+            <a:noFill/>
+          </a:ln>
+        </p:spPr>
+        <p:style>
+          <a:lnRef idx="2">
+            <a:schemeClr val="accent1">
+              <a:shade val="50000"/>
+            </a:schemeClr>
+          </a:lnRef>
+          <a:fillRef idx="1">
+            <a:schemeClr val="accent1"/>
+          </a:fillRef>
+          <a:effectRef idx="0">
+            <a:schemeClr val="accent1"/>
+          </a:effectRef>
+          <a:fontRef idx="minor">
+            <a:schemeClr val="lt1"/>
+          </a:fontRef>
+        </p:style>
+        <p:txBody>
+          <a:bodyPr rtlCol="0" anchor="ctr"/>
+          <a:lstStyle/>
+          <a:p>
+            <a:pPr algn="ctr"/>
+            <a:r>
+              <a:rPr lang="zh-TW" altLang="en-US" sz="1100" b="1" dirty="0"/>
+              <a:t>下一格是否可以移動</a:t>
+            </a:r>
+          </a:p>
+        </p:txBody>
+      </p:sp>
+      <p:cxnSp>
+        <p:nvCxnSpPr>
+          <p:cNvPr id="16" name="接點: 肘形 15">
+            <a:extLst>
+              <a:ext uri="{FF2B5EF4-FFF2-40B4-BE49-F238E27FC236}">
+                <a16:creationId xmlns:a16="http://schemas.microsoft.com/office/drawing/2014/main" id="{FA9545D8-CCB2-4D98-8846-5E482603720D}"/>
+              </a:ext>
+            </a:extLst>
+          </p:cNvPr>
+          <p:cNvCxnSpPr>
+            <a:cxnSpLocks/>
+            <a:stCxn id="9" idx="2"/>
+            <a:endCxn id="13" idx="0"/>
+          </p:cNvCxnSpPr>
+          <p:nvPr/>
+        </p:nvCxnSpPr>
+        <p:spPr>
+          <a:xfrm rot="16200000" flipH="1">
+            <a:off x="10675761" y="3017973"/>
+            <a:ext cx="316989" cy="344756"/>
+          </a:xfrm>
+          <a:prstGeom prst="bentConnector3">
+            <a:avLst/>
+          </a:prstGeom>
+          <a:ln w="38100">
+            <a:tailEnd type="triangle"/>
+          </a:ln>
+        </p:spPr>
+        <p:style>
+          <a:lnRef idx="1">
+            <a:schemeClr val="accent1"/>
+          </a:lnRef>
+          <a:fillRef idx="0">
+            <a:schemeClr val="accent1"/>
+          </a:fillRef>
+          <a:effectRef idx="0">
+            <a:schemeClr val="accent1"/>
+          </a:effectRef>
+          <a:fontRef idx="minor">
+            <a:schemeClr val="tx1"/>
+          </a:fontRef>
+        </p:style>
+      </p:cxnSp>
+      <p:sp>
+        <p:nvSpPr>
+          <p:cNvPr id="17" name="矩形 16">
+            <a:extLst>
+              <a:ext uri="{FF2B5EF4-FFF2-40B4-BE49-F238E27FC236}">
+                <a16:creationId xmlns:a16="http://schemas.microsoft.com/office/drawing/2014/main" id="{B0637DEF-A160-44EB-A848-75066484543A}"/>
+              </a:ext>
+            </a:extLst>
+          </p:cNvPr>
+          <p:cNvSpPr/>
+          <p:nvPr/>
+        </p:nvSpPr>
+        <p:spPr>
+          <a:xfrm>
+            <a:off x="9386613" y="4134243"/>
+            <a:ext cx="1139077" cy="363063"/>
+          </a:xfrm>
+          <a:prstGeom prst="rect">
+            <a:avLst/>
+          </a:prstGeom>
+          <a:ln w="38100">
+            <a:noFill/>
+          </a:ln>
+        </p:spPr>
+        <p:style>
+          <a:lnRef idx="2">
+            <a:schemeClr val="accent1">
+              <a:shade val="50000"/>
+            </a:schemeClr>
+          </a:lnRef>
+          <a:fillRef idx="1">
+            <a:schemeClr val="accent1"/>
+          </a:fillRef>
+          <a:effectRef idx="0">
+            <a:schemeClr val="accent1"/>
+          </a:effectRef>
+          <a:fontRef idx="minor">
+            <a:schemeClr val="lt1"/>
+          </a:fontRef>
+        </p:style>
+        <p:txBody>
+          <a:bodyPr rtlCol="0" anchor="ctr"/>
+          <a:lstStyle/>
+          <a:p>
+            <a:r>
+              <a:rPr lang="zh-TW" altLang="en-US" b="1" dirty="0"/>
+              <a:t>擊殺敵人</a:t>
+            </a:r>
+          </a:p>
+        </p:txBody>
+      </p:sp>
+      <p:sp>
+        <p:nvSpPr>
+          <p:cNvPr id="18" name="矩形 17">
+            <a:extLst>
+              <a:ext uri="{FF2B5EF4-FFF2-40B4-BE49-F238E27FC236}">
+                <a16:creationId xmlns:a16="http://schemas.microsoft.com/office/drawing/2014/main" id="{0928F2AD-FAD2-4DAA-85D6-83FC82139DF3}"/>
+              </a:ext>
+            </a:extLst>
+          </p:cNvPr>
+          <p:cNvSpPr/>
+          <p:nvPr/>
+        </p:nvSpPr>
+        <p:spPr>
+          <a:xfrm>
+            <a:off x="6773890" y="4134245"/>
+            <a:ext cx="1139077" cy="363063"/>
+          </a:xfrm>
+          <a:prstGeom prst="rect">
+            <a:avLst/>
+          </a:prstGeom>
+          <a:ln w="38100">
+            <a:noFill/>
+          </a:ln>
+        </p:spPr>
+        <p:style>
+          <a:lnRef idx="2">
+            <a:schemeClr val="accent1">
+              <a:shade val="50000"/>
+            </a:schemeClr>
+          </a:lnRef>
+          <a:fillRef idx="1">
+            <a:schemeClr val="accent1"/>
+          </a:fillRef>
+          <a:effectRef idx="0">
+            <a:schemeClr val="accent1"/>
+          </a:effectRef>
+          <a:fontRef idx="minor">
+            <a:schemeClr val="lt1"/>
+          </a:fontRef>
+        </p:style>
+        <p:txBody>
+          <a:bodyPr rtlCol="0" anchor="ctr"/>
+          <a:lstStyle/>
+          <a:p>
+            <a:r>
+              <a:rPr lang="zh-TW" altLang="en-US" b="1" dirty="0"/>
+              <a:t>移動木桶</a:t>
+            </a:r>
+          </a:p>
+        </p:txBody>
+      </p:sp>
+      <p:sp>
+        <p:nvSpPr>
+          <p:cNvPr id="19" name="矩形 18">
+            <a:extLst>
+              <a:ext uri="{FF2B5EF4-FFF2-40B4-BE49-F238E27FC236}">
+                <a16:creationId xmlns:a16="http://schemas.microsoft.com/office/drawing/2014/main" id="{4C18693E-317D-4A17-9AF6-E363112376E6}"/>
+              </a:ext>
+            </a:extLst>
+          </p:cNvPr>
+          <p:cNvSpPr/>
+          <p:nvPr/>
+        </p:nvSpPr>
+        <p:spPr>
+          <a:xfrm>
+            <a:off x="8097026" y="4134244"/>
+            <a:ext cx="1139077" cy="363063"/>
+          </a:xfrm>
+          <a:prstGeom prst="rect">
+            <a:avLst/>
+          </a:prstGeom>
+          <a:ln w="38100">
+            <a:noFill/>
+          </a:ln>
+        </p:spPr>
+        <p:style>
+          <a:lnRef idx="2">
+            <a:schemeClr val="accent1">
+              <a:shade val="50000"/>
+            </a:schemeClr>
+          </a:lnRef>
+          <a:fillRef idx="1">
+            <a:schemeClr val="accent1"/>
+          </a:fillRef>
+          <a:effectRef idx="0">
+            <a:schemeClr val="accent1"/>
+          </a:effectRef>
+          <a:fontRef idx="minor">
+            <a:schemeClr val="lt1"/>
+          </a:fontRef>
+        </p:style>
+        <p:txBody>
+          <a:bodyPr rtlCol="0" anchor="ctr"/>
+          <a:lstStyle/>
+          <a:p>
+            <a:r>
+              <a:rPr lang="zh-TW" altLang="en-US" b="1" dirty="0"/>
+              <a:t>移動敵人</a:t>
+            </a:r>
+          </a:p>
+        </p:txBody>
+      </p:sp>
+      <p:cxnSp>
+        <p:nvCxnSpPr>
+          <p:cNvPr id="20" name="接點: 肘形 19">
+            <a:extLst>
+              <a:ext uri="{FF2B5EF4-FFF2-40B4-BE49-F238E27FC236}">
+                <a16:creationId xmlns:a16="http://schemas.microsoft.com/office/drawing/2014/main" id="{3CAC80AD-4A1C-4789-A7FE-3E9DD04D2BBE}"/>
+              </a:ext>
+            </a:extLst>
+          </p:cNvPr>
+          <p:cNvCxnSpPr>
+            <a:cxnSpLocks/>
+            <a:stCxn id="14" idx="3"/>
+            <a:endCxn id="17" idx="0"/>
+          </p:cNvCxnSpPr>
+          <p:nvPr/>
+        </p:nvCxnSpPr>
+        <p:spPr>
+          <a:xfrm>
+            <a:off x="9846510" y="3564452"/>
+            <a:ext cx="109642" cy="569791"/>
+          </a:xfrm>
+          <a:prstGeom prst="bentConnector2">
+            <a:avLst/>
+          </a:prstGeom>
+          <a:ln w="38100">
+            <a:tailEnd type="triangle"/>
+          </a:ln>
+        </p:spPr>
+        <p:style>
+          <a:lnRef idx="1">
+            <a:schemeClr val="accent1"/>
+          </a:lnRef>
+          <a:fillRef idx="0">
+            <a:schemeClr val="accent1"/>
+          </a:fillRef>
+          <a:effectRef idx="0">
+            <a:schemeClr val="accent1"/>
+          </a:effectRef>
+          <a:fontRef idx="minor">
+            <a:schemeClr val="tx1"/>
+          </a:fontRef>
+        </p:style>
+      </p:cxnSp>
+      <p:cxnSp>
+        <p:nvCxnSpPr>
+          <p:cNvPr id="21" name="接點: 肘形 20">
+            <a:extLst>
+              <a:ext uri="{FF2B5EF4-FFF2-40B4-BE49-F238E27FC236}">
+                <a16:creationId xmlns:a16="http://schemas.microsoft.com/office/drawing/2014/main" id="{4D621818-07FB-49CA-9157-89159A666A62}"/>
+              </a:ext>
+            </a:extLst>
+          </p:cNvPr>
+          <p:cNvCxnSpPr>
+            <a:cxnSpLocks/>
+            <a:stCxn id="14" idx="2"/>
+            <a:endCxn id="19" idx="0"/>
+          </p:cNvCxnSpPr>
+          <p:nvPr/>
+        </p:nvCxnSpPr>
+        <p:spPr>
+          <a:xfrm rot="5400000">
+            <a:off x="8851193" y="3806792"/>
+            <a:ext cx="142825" cy="512079"/>
+          </a:xfrm>
+          <a:prstGeom prst="bentConnector3">
+            <a:avLst/>
+          </a:prstGeom>
+          <a:ln w="38100">
+            <a:tailEnd type="triangle"/>
+          </a:ln>
+        </p:spPr>
+        <p:style>
+          <a:lnRef idx="1">
+            <a:schemeClr val="accent1"/>
+          </a:lnRef>
+          <a:fillRef idx="0">
+            <a:schemeClr val="accent1"/>
+          </a:fillRef>
+          <a:effectRef idx="0">
+            <a:schemeClr val="accent1"/>
+          </a:effectRef>
+          <a:fontRef idx="minor">
+            <a:schemeClr val="tx1"/>
+          </a:fontRef>
+        </p:style>
+      </p:cxnSp>
+      <p:cxnSp>
+        <p:nvCxnSpPr>
+          <p:cNvPr id="22" name="接點: 肘形 21">
+            <a:extLst>
+              <a:ext uri="{FF2B5EF4-FFF2-40B4-BE49-F238E27FC236}">
+                <a16:creationId xmlns:a16="http://schemas.microsoft.com/office/drawing/2014/main" id="{E43A2EC2-633A-4815-96C4-66C0D3BA86E3}"/>
+              </a:ext>
+            </a:extLst>
+          </p:cNvPr>
+          <p:cNvCxnSpPr>
+            <a:cxnSpLocks/>
+            <a:stCxn id="15" idx="2"/>
+            <a:endCxn id="18" idx="0"/>
+          </p:cNvCxnSpPr>
+          <p:nvPr/>
+        </p:nvCxnSpPr>
+        <p:spPr>
+          <a:xfrm rot="5400000">
+            <a:off x="7441828" y="3873391"/>
+            <a:ext cx="162455" cy="359252"/>
+          </a:xfrm>
+          <a:prstGeom prst="bentConnector3">
+            <a:avLst/>
+          </a:prstGeom>
+          <a:ln w="38100">
+            <a:tailEnd type="triangle"/>
+          </a:ln>
+        </p:spPr>
+        <p:style>
+          <a:lnRef idx="1">
+            <a:schemeClr val="accent1"/>
+          </a:lnRef>
+          <a:fillRef idx="0">
+            <a:schemeClr val="accent1"/>
+          </a:fillRef>
+          <a:effectRef idx="0">
+            <a:schemeClr val="accent1"/>
+          </a:effectRef>
+          <a:fontRef idx="minor">
+            <a:schemeClr val="tx1"/>
+          </a:fontRef>
+        </p:style>
+      </p:cxnSp>
+      <p:cxnSp>
+        <p:nvCxnSpPr>
+          <p:cNvPr id="23" name="接點: 肘形 22">
+            <a:extLst>
+              <a:ext uri="{FF2B5EF4-FFF2-40B4-BE49-F238E27FC236}">
+                <a16:creationId xmlns:a16="http://schemas.microsoft.com/office/drawing/2014/main" id="{7139EEB9-F38A-4D97-8BD2-D0A9D910FF52}"/>
+              </a:ext>
+            </a:extLst>
+          </p:cNvPr>
+          <p:cNvCxnSpPr>
+            <a:cxnSpLocks/>
+            <a:stCxn id="7" idx="2"/>
+            <a:endCxn id="15" idx="0"/>
+          </p:cNvCxnSpPr>
+          <p:nvPr/>
+        </p:nvCxnSpPr>
+        <p:spPr>
+          <a:xfrm rot="5400000">
+            <a:off x="7646078" y="3090992"/>
+            <a:ext cx="113208" cy="1"/>
+          </a:xfrm>
+          <a:prstGeom prst="bentConnector3">
+            <a:avLst/>
+          </a:prstGeom>
+          <a:ln w="38100">
+            <a:tailEnd type="triangle"/>
+          </a:ln>
+        </p:spPr>
+        <p:style>
+          <a:lnRef idx="1">
+            <a:schemeClr val="accent1"/>
+          </a:lnRef>
+          <a:fillRef idx="0">
+            <a:schemeClr val="accent1"/>
+          </a:fillRef>
+          <a:effectRef idx="0">
+            <a:schemeClr val="accent1"/>
+          </a:effectRef>
+          <a:fontRef idx="minor">
+            <a:schemeClr val="tx1"/>
+          </a:fontRef>
+        </p:style>
+      </p:cxnSp>
+      <p:cxnSp>
+        <p:nvCxnSpPr>
+          <p:cNvPr id="24" name="接點: 肘形 23">
+            <a:extLst>
+              <a:ext uri="{FF2B5EF4-FFF2-40B4-BE49-F238E27FC236}">
+                <a16:creationId xmlns:a16="http://schemas.microsoft.com/office/drawing/2014/main" id="{D3DA1FB1-56E5-43AE-814F-61E63B1F92B5}"/>
+              </a:ext>
+            </a:extLst>
+          </p:cNvPr>
+          <p:cNvCxnSpPr>
+            <a:cxnSpLocks/>
+            <a:stCxn id="8" idx="2"/>
+            <a:endCxn id="14" idx="0"/>
+          </p:cNvCxnSpPr>
+          <p:nvPr/>
+        </p:nvCxnSpPr>
+        <p:spPr>
+          <a:xfrm rot="16200000" flipH="1">
+            <a:off x="9127094" y="3085934"/>
+            <a:ext cx="103096" cy="4"/>
+          </a:xfrm>
+          <a:prstGeom prst="bentConnector3">
+            <a:avLst/>
+          </a:prstGeom>
+          <a:ln w="38100">
+            <a:tailEnd type="triangle"/>
+          </a:ln>
+        </p:spPr>
+        <p:style>
+          <a:lnRef idx="1">
+            <a:schemeClr val="accent1"/>
+          </a:lnRef>
+          <a:fillRef idx="0">
+            <a:schemeClr val="accent1"/>
+          </a:fillRef>
+          <a:effectRef idx="0">
+            <a:schemeClr val="accent1"/>
+          </a:effectRef>
+          <a:fontRef idx="minor">
+            <a:schemeClr val="tx1"/>
+          </a:fontRef>
+        </p:style>
+      </p:cxnSp>
+      <p:sp>
+        <p:nvSpPr>
+          <p:cNvPr id="25" name="流程圖: 決策 24">
+            <a:extLst>
+              <a:ext uri="{FF2B5EF4-FFF2-40B4-BE49-F238E27FC236}">
+                <a16:creationId xmlns:a16="http://schemas.microsoft.com/office/drawing/2014/main" id="{F8E018BB-1029-4900-B1E7-4FBA02A2B4BE}"/>
+              </a:ext>
+            </a:extLst>
+          </p:cNvPr>
+          <p:cNvSpPr/>
+          <p:nvPr/>
+        </p:nvSpPr>
+        <p:spPr>
+          <a:xfrm>
+            <a:off x="7297903" y="4657026"/>
+            <a:ext cx="2096902" cy="829238"/>
+          </a:xfrm>
+          <a:prstGeom prst="flowChartDecision">
+            <a:avLst/>
+          </a:prstGeom>
+          <a:ln w="38100">
+            <a:noFill/>
+          </a:ln>
+        </p:spPr>
+        <p:style>
+          <a:lnRef idx="2">
+            <a:schemeClr val="accent1">
+              <a:shade val="50000"/>
+            </a:schemeClr>
+          </a:lnRef>
+          <a:fillRef idx="1">
+            <a:schemeClr val="accent1"/>
+          </a:fillRef>
+          <a:effectRef idx="0">
+            <a:schemeClr val="accent1"/>
+          </a:effectRef>
+          <a:fontRef idx="minor">
+            <a:schemeClr val="lt1"/>
+          </a:fontRef>
+        </p:style>
+        <p:txBody>
+          <a:bodyPr rtlCol="0" anchor="ctr"/>
+          <a:lstStyle/>
+          <a:p>
+            <a:pPr algn="ctr"/>
+            <a:r>
+              <a:rPr lang="zh-TW" altLang="en-US" sz="1400" b="1" dirty="0"/>
+              <a:t>是否</a:t>
+            </a:r>
+            <a:br>
+              <a:rPr lang="en-US" altLang="zh-TW" sz="1400" b="1" dirty="0"/>
+            </a:br>
+            <a:r>
+              <a:rPr lang="zh-TW" altLang="en-US" sz="1400" b="1" dirty="0"/>
+              <a:t>踩到尖刺</a:t>
+            </a:r>
+          </a:p>
+        </p:txBody>
+      </p:sp>
+      <p:sp>
+        <p:nvSpPr>
+          <p:cNvPr id="26" name="矩形 25">
+            <a:extLst>
+              <a:ext uri="{FF2B5EF4-FFF2-40B4-BE49-F238E27FC236}">
+                <a16:creationId xmlns:a16="http://schemas.microsoft.com/office/drawing/2014/main" id="{3CB3132A-0747-4DE3-A8C7-2BEE5BEC9501}"/>
+              </a:ext>
+            </a:extLst>
+          </p:cNvPr>
+          <p:cNvSpPr/>
+          <p:nvPr/>
+        </p:nvSpPr>
+        <p:spPr>
+          <a:xfrm>
+            <a:off x="7134407" y="1378675"/>
+            <a:ext cx="1593756" cy="414619"/>
+          </a:xfrm>
+          <a:prstGeom prst="rect">
+            <a:avLst/>
+          </a:prstGeom>
+          <a:ln w="38100">
+            <a:noFill/>
+          </a:ln>
+        </p:spPr>
+        <p:style>
+          <a:lnRef idx="2">
+            <a:schemeClr val="accent1">
+              <a:shade val="50000"/>
+            </a:schemeClr>
+          </a:lnRef>
+          <a:fillRef idx="1">
+            <a:schemeClr val="accent1"/>
+          </a:fillRef>
+          <a:effectRef idx="0">
+            <a:schemeClr val="accent1"/>
+          </a:effectRef>
+          <a:fontRef idx="minor">
+            <a:schemeClr val="lt1"/>
+          </a:fontRef>
+        </p:style>
+        <p:txBody>
+          <a:bodyPr rtlCol="0" anchor="ctr"/>
+          <a:lstStyle/>
+          <a:p>
+            <a:pPr algn="ctr"/>
+            <a:r>
+              <a:rPr lang="zh-TW" altLang="en-US" b="1" dirty="0"/>
+              <a:t>減少剩餘次數</a:t>
+            </a:r>
+          </a:p>
+        </p:txBody>
+      </p:sp>
+      <p:sp>
+        <p:nvSpPr>
+          <p:cNvPr id="27" name="矩形 26">
+            <a:extLst>
+              <a:ext uri="{FF2B5EF4-FFF2-40B4-BE49-F238E27FC236}">
+                <a16:creationId xmlns:a16="http://schemas.microsoft.com/office/drawing/2014/main" id="{ECAC011F-C3D7-48E3-9D7D-0C4D71C56239}"/>
+              </a:ext>
+            </a:extLst>
+          </p:cNvPr>
+          <p:cNvSpPr/>
+          <p:nvPr/>
+        </p:nvSpPr>
+        <p:spPr>
+          <a:xfrm>
+            <a:off x="7510727" y="5597163"/>
+            <a:ext cx="1679972" cy="401174"/>
+          </a:xfrm>
+          <a:prstGeom prst="rect">
+            <a:avLst/>
+          </a:prstGeom>
+          <a:ln w="38100">
+            <a:noFill/>
+          </a:ln>
+        </p:spPr>
+        <p:style>
+          <a:lnRef idx="2">
+            <a:schemeClr val="accent1">
+              <a:shade val="50000"/>
+            </a:schemeClr>
+          </a:lnRef>
+          <a:fillRef idx="1">
+            <a:schemeClr val="accent1"/>
+          </a:fillRef>
+          <a:effectRef idx="0">
+            <a:schemeClr val="accent1"/>
+          </a:effectRef>
+          <a:fontRef idx="minor">
+            <a:schemeClr val="lt1"/>
+          </a:fontRef>
+        </p:style>
+        <p:txBody>
+          <a:bodyPr rtlCol="0" anchor="ctr"/>
+          <a:lstStyle/>
+          <a:p>
+            <a:pPr algn="ctr"/>
+            <a:r>
+              <a:rPr lang="zh-TW" altLang="en-US" b="1" dirty="0"/>
+              <a:t>減少剩餘次數</a:t>
+            </a:r>
+          </a:p>
+        </p:txBody>
+      </p:sp>
+      <p:cxnSp>
+        <p:nvCxnSpPr>
+          <p:cNvPr id="28" name="接點: 肘形 27">
+            <a:extLst>
+              <a:ext uri="{FF2B5EF4-FFF2-40B4-BE49-F238E27FC236}">
+                <a16:creationId xmlns:a16="http://schemas.microsoft.com/office/drawing/2014/main" id="{85AA8BE7-376D-4D6E-9C58-F216214866A8}"/>
+              </a:ext>
+            </a:extLst>
+          </p:cNvPr>
+          <p:cNvCxnSpPr>
+            <a:cxnSpLocks/>
+            <a:stCxn id="26" idx="2"/>
+            <a:endCxn id="7" idx="0"/>
+          </p:cNvCxnSpPr>
+          <p:nvPr/>
+        </p:nvCxnSpPr>
+        <p:spPr>
+          <a:xfrm rot="5400000">
+            <a:off x="7611056" y="1884921"/>
+            <a:ext cx="411856" cy="228603"/>
+          </a:xfrm>
+          <a:prstGeom prst="bentConnector3">
+            <a:avLst/>
+          </a:prstGeom>
+          <a:ln w="38100">
+            <a:tailEnd type="triangle"/>
+          </a:ln>
+        </p:spPr>
+        <p:style>
+          <a:lnRef idx="1">
+            <a:schemeClr val="accent1"/>
+          </a:lnRef>
+          <a:fillRef idx="0">
+            <a:schemeClr val="accent1"/>
+          </a:fillRef>
+          <a:effectRef idx="0">
+            <a:schemeClr val="accent1"/>
+          </a:effectRef>
+          <a:fontRef idx="minor">
+            <a:schemeClr val="tx1"/>
+          </a:fontRef>
+        </p:style>
+      </p:cxnSp>
+      <p:cxnSp>
+        <p:nvCxnSpPr>
+          <p:cNvPr id="29" name="接點: 肘形 28">
+            <a:extLst>
+              <a:ext uri="{FF2B5EF4-FFF2-40B4-BE49-F238E27FC236}">
+                <a16:creationId xmlns:a16="http://schemas.microsoft.com/office/drawing/2014/main" id="{1E0F70FC-D096-4016-ADB4-9C9D90EB735E}"/>
+              </a:ext>
+            </a:extLst>
+          </p:cNvPr>
+          <p:cNvCxnSpPr>
+            <a:cxnSpLocks/>
+            <a:stCxn id="25" idx="2"/>
+            <a:endCxn id="27" idx="0"/>
+          </p:cNvCxnSpPr>
+          <p:nvPr/>
+        </p:nvCxnSpPr>
+        <p:spPr>
+          <a:xfrm rot="16200000" flipH="1">
+            <a:off x="8293084" y="5539533"/>
+            <a:ext cx="110899" cy="4359"/>
+          </a:xfrm>
+          <a:prstGeom prst="bentConnector3">
+            <a:avLst>
+              <a:gd name="adj1" fmla="val 50000"/>
+            </a:avLst>
+          </a:prstGeom>
+          <a:ln w="38100">
+            <a:tailEnd type="triangle"/>
+          </a:ln>
+        </p:spPr>
+        <p:style>
+          <a:lnRef idx="1">
+            <a:schemeClr val="accent1"/>
+          </a:lnRef>
+          <a:fillRef idx="0">
+            <a:schemeClr val="accent1"/>
+          </a:fillRef>
+          <a:effectRef idx="0">
+            <a:schemeClr val="accent1"/>
+          </a:effectRef>
+          <a:fontRef idx="minor">
+            <a:schemeClr val="tx1"/>
+          </a:fontRef>
+        </p:style>
+      </p:cxnSp>
+      <p:cxnSp>
+        <p:nvCxnSpPr>
+          <p:cNvPr id="30" name="接點: 肘形 29">
+            <a:extLst>
+              <a:ext uri="{FF2B5EF4-FFF2-40B4-BE49-F238E27FC236}">
+                <a16:creationId xmlns:a16="http://schemas.microsoft.com/office/drawing/2014/main" id="{0B2FD6C0-EC22-4330-9058-6AF64B8BF798}"/>
+              </a:ext>
+            </a:extLst>
+          </p:cNvPr>
+          <p:cNvCxnSpPr>
+            <a:stCxn id="25" idx="3"/>
+            <a:endCxn id="6" idx="0"/>
+          </p:cNvCxnSpPr>
+          <p:nvPr/>
+        </p:nvCxnSpPr>
+        <p:spPr>
+          <a:xfrm>
+            <a:off x="9394805" y="5071645"/>
+            <a:ext cx="1296966" cy="91268"/>
+          </a:xfrm>
+          <a:prstGeom prst="bentConnector2">
+            <a:avLst/>
+          </a:prstGeom>
+          <a:ln w="38100">
+            <a:tailEnd type="triangle"/>
+          </a:ln>
+        </p:spPr>
+        <p:style>
+          <a:lnRef idx="1">
+            <a:schemeClr val="accent1"/>
+          </a:lnRef>
+          <a:fillRef idx="0">
+            <a:schemeClr val="accent1"/>
+          </a:fillRef>
+          <a:effectRef idx="0">
+            <a:schemeClr val="accent1"/>
+          </a:effectRef>
+          <a:fontRef idx="minor">
+            <a:schemeClr val="tx1"/>
+          </a:fontRef>
+        </p:style>
+      </p:cxnSp>
+      <p:cxnSp>
+        <p:nvCxnSpPr>
+          <p:cNvPr id="31" name="接點: 肘形 30">
+            <a:extLst>
+              <a:ext uri="{FF2B5EF4-FFF2-40B4-BE49-F238E27FC236}">
+                <a16:creationId xmlns:a16="http://schemas.microsoft.com/office/drawing/2014/main" id="{4813360D-5D6B-4394-9C00-2BD3D5CC4F71}"/>
+              </a:ext>
+            </a:extLst>
+          </p:cNvPr>
+          <p:cNvCxnSpPr>
+            <a:stCxn id="18" idx="2"/>
+            <a:endCxn id="25" idx="0"/>
+          </p:cNvCxnSpPr>
+          <p:nvPr/>
+        </p:nvCxnSpPr>
+        <p:spPr>
+          <a:xfrm rot="16200000" flipH="1">
+            <a:off x="7765032" y="4075704"/>
+            <a:ext cx="159718" cy="1002925"/>
+          </a:xfrm>
+          <a:prstGeom prst="bentConnector3">
+            <a:avLst/>
+          </a:prstGeom>
+          <a:ln w="38100">
+            <a:tailEnd type="triangle"/>
+          </a:ln>
+        </p:spPr>
+        <p:style>
+          <a:lnRef idx="1">
+            <a:schemeClr val="accent1"/>
+          </a:lnRef>
+          <a:fillRef idx="0">
+            <a:schemeClr val="accent1"/>
+          </a:fillRef>
+          <a:effectRef idx="0">
+            <a:schemeClr val="accent1"/>
+          </a:effectRef>
+          <a:fontRef idx="minor">
+            <a:schemeClr val="tx1"/>
+          </a:fontRef>
+        </p:style>
+      </p:cxnSp>
+      <p:cxnSp>
+        <p:nvCxnSpPr>
+          <p:cNvPr id="32" name="接點: 肘形 31">
+            <a:extLst>
+              <a:ext uri="{FF2B5EF4-FFF2-40B4-BE49-F238E27FC236}">
+                <a16:creationId xmlns:a16="http://schemas.microsoft.com/office/drawing/2014/main" id="{3D895E39-4A30-448F-AC9B-56FF5EFE0F4B}"/>
+              </a:ext>
+            </a:extLst>
+          </p:cNvPr>
+          <p:cNvCxnSpPr>
+            <a:cxnSpLocks/>
+            <a:stCxn id="27" idx="2"/>
+            <a:endCxn id="6" idx="0"/>
+          </p:cNvCxnSpPr>
+          <p:nvPr/>
+        </p:nvCxnSpPr>
+        <p:spPr>
+          <a:xfrm rot="5400000" flipH="1" flipV="1">
+            <a:off x="9103530" y="4410096"/>
+            <a:ext cx="835424" cy="2341058"/>
+          </a:xfrm>
+          <a:prstGeom prst="bentConnector5">
+            <a:avLst>
+              <a:gd name="adj1" fmla="val -10194"/>
+              <a:gd name="adj2" fmla="val 48889"/>
+              <a:gd name="adj3" fmla="val 111267"/>
+            </a:avLst>
+          </a:prstGeom>
+          <a:ln w="38100">
+            <a:tailEnd type="triangle"/>
+          </a:ln>
+        </p:spPr>
+        <p:style>
+          <a:lnRef idx="1">
+            <a:schemeClr val="accent1"/>
+          </a:lnRef>
+          <a:fillRef idx="0">
+            <a:schemeClr val="accent1"/>
+          </a:fillRef>
+          <a:effectRef idx="0">
+            <a:schemeClr val="accent1"/>
+          </a:effectRef>
+          <a:fontRef idx="minor">
+            <a:schemeClr val="tx1"/>
+          </a:fontRef>
+        </p:style>
+      </p:cxnSp>
+      <p:cxnSp>
+        <p:nvCxnSpPr>
+          <p:cNvPr id="33" name="接點: 肘形 32">
+            <a:extLst>
+              <a:ext uri="{FF2B5EF4-FFF2-40B4-BE49-F238E27FC236}">
+                <a16:creationId xmlns:a16="http://schemas.microsoft.com/office/drawing/2014/main" id="{8D010528-59A0-4C5B-B1C6-356227F30C32}"/>
+              </a:ext>
+            </a:extLst>
+          </p:cNvPr>
+          <p:cNvCxnSpPr>
+            <a:stCxn id="19" idx="2"/>
+            <a:endCxn id="25" idx="0"/>
+          </p:cNvCxnSpPr>
+          <p:nvPr/>
+        </p:nvCxnSpPr>
+        <p:spPr>
+          <a:xfrm rot="5400000">
+            <a:off x="8426601" y="4417061"/>
+            <a:ext cx="159719" cy="320211"/>
+          </a:xfrm>
+          <a:prstGeom prst="bentConnector3">
+            <a:avLst/>
+          </a:prstGeom>
+          <a:ln w="38100">
+            <a:tailEnd type="triangle"/>
+          </a:ln>
+        </p:spPr>
+        <p:style>
+          <a:lnRef idx="1">
+            <a:schemeClr val="accent1"/>
+          </a:lnRef>
+          <a:fillRef idx="0">
+            <a:schemeClr val="accent1"/>
+          </a:fillRef>
+          <a:effectRef idx="0">
+            <a:schemeClr val="accent1"/>
+          </a:effectRef>
+          <a:fontRef idx="minor">
+            <a:schemeClr val="tx1"/>
+          </a:fontRef>
+        </p:style>
+      </p:cxnSp>
+      <p:cxnSp>
+        <p:nvCxnSpPr>
+          <p:cNvPr id="34" name="接點: 肘形 33">
+            <a:extLst>
+              <a:ext uri="{FF2B5EF4-FFF2-40B4-BE49-F238E27FC236}">
+                <a16:creationId xmlns:a16="http://schemas.microsoft.com/office/drawing/2014/main" id="{979BA29D-80FF-4AEE-AE38-69C075671AED}"/>
+              </a:ext>
+            </a:extLst>
+          </p:cNvPr>
+          <p:cNvCxnSpPr>
+            <a:stCxn id="17" idx="2"/>
+            <a:endCxn id="25" idx="0"/>
+          </p:cNvCxnSpPr>
+          <p:nvPr/>
+        </p:nvCxnSpPr>
+        <p:spPr>
+          <a:xfrm rot="5400000">
+            <a:off x="9071393" y="3772267"/>
+            <a:ext cx="159720" cy="1609798"/>
+          </a:xfrm>
+          <a:prstGeom prst="bentConnector3">
+            <a:avLst/>
+          </a:prstGeom>
+          <a:ln w="38100">
+            <a:tailEnd type="triangle"/>
+          </a:ln>
+        </p:spPr>
+        <p:style>
+          <a:lnRef idx="1">
+            <a:schemeClr val="accent1"/>
+          </a:lnRef>
+          <a:fillRef idx="0">
+            <a:schemeClr val="accent1"/>
+          </a:fillRef>
+          <a:effectRef idx="0">
+            <a:schemeClr val="accent1"/>
+          </a:effectRef>
+          <a:fontRef idx="minor">
+            <a:schemeClr val="tx1"/>
+          </a:fontRef>
+        </p:style>
+      </p:cxnSp>
+      <p:sp>
+        <p:nvSpPr>
+          <p:cNvPr id="35" name="標題 1">
+            <a:extLst>
+              <a:ext uri="{FF2B5EF4-FFF2-40B4-BE49-F238E27FC236}">
+                <a16:creationId xmlns:a16="http://schemas.microsoft.com/office/drawing/2014/main" id="{D96207C7-57D4-453D-9FC6-6436313D23AC}"/>
+              </a:ext>
+            </a:extLst>
+          </p:cNvPr>
+          <p:cNvSpPr txBox="1">
+            <a:spLocks/>
+          </p:cNvSpPr>
+          <p:nvPr/>
+        </p:nvSpPr>
+        <p:spPr>
+          <a:xfrm>
+            <a:off x="8536750" y="6206909"/>
+            <a:ext cx="1996264" cy="594629"/>
+          </a:xfrm>
+          <a:prstGeom prst="rect">
+            <a:avLst/>
+          </a:prstGeom>
+          <a:ln w="38100">
+            <a:noFill/>
+          </a:ln>
+        </p:spPr>
+        <p:txBody>
+          <a:bodyPr vert="horz" lIns="91440" tIns="45720" rIns="91440" bIns="45720" rtlCol="0" anchor="ctr">
+            <a:normAutofit/>
+          </a:bodyPr>
+          <a:lstStyle>
+            <a:lvl1pPr algn="l" defTabSz="914400" rtl="0" eaLnBrk="1" latinLnBrk="0" hangingPunct="1">
+              <a:lnSpc>
+                <a:spcPct val="89000"/>
+              </a:lnSpc>
+              <a:spcBef>
+                <a:spcPct val="0"/>
+              </a:spcBef>
+              <a:buNone/>
+              <a:defRPr sz="4400" kern="1200" baseline="0">
+                <a:solidFill>
+                  <a:schemeClr val="tx2"/>
+                </a:solidFill>
+                <a:latin typeface="+mj-lt"/>
+                <a:ea typeface="+mj-ea"/>
+                <a:cs typeface="+mj-cs"/>
+              </a:defRPr>
+            </a:lvl1pPr>
+          </a:lstStyle>
+          <a:p>
+            <a:r>
+              <a:rPr lang="zh-TW" altLang="en-US" sz="2000" b="1" dirty="0"/>
+              <a:t>遊戲邏輯流程圖</a:t>
+            </a:r>
           </a:p>
         </p:txBody>
       </p:sp>
     </p:spTree>
     <p:extLst>
       <p:ext uri="{BB962C8B-B14F-4D97-AF65-F5344CB8AC3E}">
-        <p14:creationId xmlns:p14="http://schemas.microsoft.com/office/powerpoint/2010/main" val="1383920495"/>
+        <p14:creationId xmlns:p14="http://schemas.microsoft.com/office/powerpoint/2010/main" val="3158272200"/>
       </p:ext>
     </p:extLst>
   </p:cSld>

</xml_diff>